<commit_message>
Script inicial de banco de dados
</commit_message>
<xml_diff>
--- a/Documentacao/ModelagemSistema_TemplateInicial.pptx
+++ b/Documentacao/ModelagemSistema_TemplateInicial.pptx
@@ -215,7 +215,7 @@
           <a:p>
             <a:fld id="{93DDA81E-B6DD-4CA0-9C2D-B0C27B95DC2C}" type="datetimeFigureOut">
               <a:rPr lang="pt-BR" smtClean="0"/>
-              <a:t>22/01/2025</a:t>
+              <a:t>24/01/2025</a:t>
             </a:fld>
             <a:endParaRPr lang="pt-BR"/>
           </a:p>
@@ -2555,7 +2555,7 @@
           <a:p>
             <a:fld id="{C128FA71-3A18-48C0-980F-4B68F7F63042}" type="datetime1">
               <a:rPr lang="en-US" smtClean="0"/>
-              <a:t>1/22/2025</a:t>
+              <a:t>1/24/2025</a:t>
             </a:fld>
             <a:endParaRPr lang="en-US"/>
           </a:p>
@@ -2763,7 +2763,7 @@
           <a:p>
             <a:fld id="{7104EDB3-C0E8-45F8-9E1D-1B6C8D1880C0}" type="datetime1">
               <a:rPr lang="en-US" smtClean="0"/>
-              <a:t>1/22/2025</a:t>
+              <a:t>1/24/2025</a:t>
             </a:fld>
             <a:endParaRPr lang="en-US"/>
           </a:p>
@@ -2973,7 +2973,7 @@
           <a:p>
             <a:fld id="{9CF0EC4B-54ED-4041-B552-9BA760FA3DBA}" type="datetime1">
               <a:rPr lang="en-US" smtClean="0"/>
-              <a:t>1/22/2025</a:t>
+              <a:t>1/24/2025</a:t>
             </a:fld>
             <a:endParaRPr lang="en-US"/>
           </a:p>
@@ -3171,7 +3171,7 @@
           <a:p>
             <a:fld id="{51C1210E-201E-4473-82AC-2466F5386C38}" type="datetime1">
               <a:rPr lang="en-US" smtClean="0"/>
-              <a:t>1/22/2025</a:t>
+              <a:t>1/24/2025</a:t>
             </a:fld>
             <a:endParaRPr lang="en-US"/>
           </a:p>
@@ -3449,7 +3449,7 @@
           <a:p>
             <a:fld id="{B01EA198-6CAB-4B8F-B93F-1F9C8C4B6CE7}" type="datetime1">
               <a:rPr lang="en-US" smtClean="0"/>
-              <a:t>1/22/2025</a:t>
+              <a:t>1/24/2025</a:t>
             </a:fld>
             <a:endParaRPr lang="en-US"/>
           </a:p>
@@ -3721,7 +3721,7 @@
           <a:p>
             <a:fld id="{CA06041F-4525-44D5-AA4F-332294BF1F56}" type="datetime1">
               <a:rPr lang="en-US" smtClean="0"/>
-              <a:t>1/22/2025</a:t>
+              <a:t>1/24/2025</a:t>
             </a:fld>
             <a:endParaRPr lang="en-US"/>
           </a:p>
@@ -4145,7 +4145,7 @@
           <a:p>
             <a:fld id="{F9557091-BBDF-4EB9-BA6B-2BB67AC4FC0F}" type="datetime1">
               <a:rPr lang="en-US" smtClean="0"/>
-              <a:t>1/22/2025</a:t>
+              <a:t>1/24/2025</a:t>
             </a:fld>
             <a:endParaRPr lang="en-US"/>
           </a:p>
@@ -4286,7 +4286,7 @@
           <a:p>
             <a:fld id="{2D6B226B-77A6-410C-9796-083F278E0125}" type="datetime1">
               <a:rPr lang="en-US" smtClean="0"/>
-              <a:t>1/22/2025</a:t>
+              <a:t>1/24/2025</a:t>
             </a:fld>
             <a:endParaRPr lang="en-US"/>
           </a:p>
@@ -4399,7 +4399,7 @@
           <a:p>
             <a:fld id="{A23A578B-D289-4C40-8593-3D356C49DA58}" type="datetime1">
               <a:rPr lang="en-US" smtClean="0"/>
-              <a:t>1/22/2025</a:t>
+              <a:t>1/24/2025</a:t>
             </a:fld>
             <a:endParaRPr lang="en-US"/>
           </a:p>
@@ -4718,7 +4718,7 @@
           <a:p>
             <a:fld id="{713DFAE3-14DB-48A7-A80F-80DDB072CE3D}" type="datetime1">
               <a:rPr lang="en-US" smtClean="0"/>
-              <a:t>1/22/2025</a:t>
+              <a:t>1/24/2025</a:t>
             </a:fld>
             <a:endParaRPr lang="en-US"/>
           </a:p>
@@ -5012,7 +5012,7 @@
           <a:p>
             <a:fld id="{92C5EAEF-6478-4102-8F5D-A5FE9FC97ACB}" type="datetime1">
               <a:rPr lang="en-US" smtClean="0"/>
-              <a:t>1/22/2025</a:t>
+              <a:t>1/24/2025</a:t>
             </a:fld>
             <a:endParaRPr lang="en-US"/>
           </a:p>
@@ -5253,7 +5253,7 @@
           <a:p>
             <a:fld id="{67F45AC6-C491-4585-A584-9CE2AF7D5500}" type="datetime1">
               <a:rPr lang="en-US" smtClean="0"/>
-              <a:t>1/22/2025</a:t>
+              <a:t>1/24/2025</a:t>
             </a:fld>
             <a:endParaRPr lang="en-US"/>
           </a:p>
@@ -5683,7 +5683,7 @@
                 <a16:creationId xmlns:a16="http://schemas.microsoft.com/office/drawing/2014/main" id="{6E448DB1-4196-18A6-15DA-C72635C1B11E}"/>
               </a:ext>
               <a:ext uri="{C183D7F6-B498-43B3-948B-1728B52AA6E4}">
-                <adec:decorative xmlns="" xmlns:adec="http://schemas.microsoft.com/office/drawing/2017/decorative" val="1"/>
+                <adec:decorative xmlns:adec="http://schemas.microsoft.com/office/drawing/2017/decorative" xmlns="" val="1"/>
               </a:ext>
             </a:extLst>
           </p:cNvPr>
@@ -5791,7 +5791,7 @@
                 <a16:creationId xmlns:a16="http://schemas.microsoft.com/office/drawing/2014/main" id="{76A10D8F-D463-70E5-239B-17AD65EF433D}"/>
               </a:ext>
               <a:ext uri="{C183D7F6-B498-43B3-948B-1728B52AA6E4}">
-                <adec:decorative xmlns="" xmlns:adec="http://schemas.microsoft.com/office/drawing/2017/decorative" val="1"/>
+                <adec:decorative xmlns:adec="http://schemas.microsoft.com/office/drawing/2017/decorative" xmlns="" val="1"/>
               </a:ext>
             </a:extLst>
           </p:cNvPr>
@@ -6252,7 +6252,7 @@
                 <a16:creationId xmlns:a16="http://schemas.microsoft.com/office/drawing/2014/main" id="{74EA76C7-8C08-E029-0E79-750B71C94A62}"/>
               </a:ext>
               <a:ext uri="{C183D7F6-B498-43B3-948B-1728B52AA6E4}">
-                <adec:decorative xmlns="" xmlns:adec="http://schemas.microsoft.com/office/drawing/2017/decorative" val="1"/>
+                <adec:decorative xmlns:adec="http://schemas.microsoft.com/office/drawing/2017/decorative" xmlns="" val="1"/>
               </a:ext>
             </a:extLst>
           </p:cNvPr>
@@ -6391,7 +6391,7 @@
             <p:ph sz="half" idx="2"/>
             <p:extLst>
               <p:ext uri="{E7BDC344-281C-4309-B0C6-D0EE65EED2A8}">
-                <p202:designPr xmlns="" xmlns:p202="http://schemas.microsoft.com/office/powerpoint/2020/02/main">
+                <p202:designPr xmlns:p202="http://schemas.microsoft.com/office/powerpoint/2020/02/main" xmlns="">
                   <p202:designTagLst>
                     <p202:designTag name="ARCH:1:CLS" val="InformationBlock"/>
                     <p202:designTag name="ARCH:1:VSVAR" val="TitledTextBox"/>
@@ -6687,7 +6687,7 @@
                 <a16:creationId xmlns:a16="http://schemas.microsoft.com/office/drawing/2014/main" id="{74EA76C7-8C08-E029-0E79-750B71C94A62}"/>
               </a:ext>
               <a:ext uri="{C183D7F6-B498-43B3-948B-1728B52AA6E4}">
-                <adec:decorative xmlns="" xmlns:adec="http://schemas.microsoft.com/office/drawing/2017/decorative" val="1"/>
+                <adec:decorative xmlns:adec="http://schemas.microsoft.com/office/drawing/2017/decorative" xmlns="" val="1"/>
               </a:ext>
             </a:extLst>
           </p:cNvPr>
@@ -6851,8 +6851,8 @@
         </p:nvSpPr>
         <p:spPr>
           <a:xfrm>
-            <a:off x="1927947" y="4893733"/>
-            <a:ext cx="928142" cy="1524000"/>
+            <a:off x="1939849" y="4855649"/>
+            <a:ext cx="3964240" cy="1524000"/>
           </a:xfrm>
           <a:prstGeom prst="rect">
             <a:avLst/>
@@ -6879,10 +6879,6 @@
           <a:lstStyle/>
           <a:p>
             <a:pPr algn="ctr"/>
-            <a:r>
-              <a:rPr lang="pt-BR" dirty="0" smtClean="0"/>
-              <a:t>DB</a:t>
-            </a:r>
             <a:endParaRPr lang="pt-BR" dirty="0"/>
           </a:p>
         </p:txBody>
@@ -7206,7 +7202,7 @@
         </p:nvSpPr>
         <p:spPr>
           <a:xfrm>
-            <a:off x="3094381" y="4432187"/>
+            <a:off x="1783644" y="5340801"/>
             <a:ext cx="5916168" cy="1527048"/>
           </a:xfrm>
           <a:prstGeom prst="rect">
@@ -7305,6 +7301,94 @@
               <a:t> Angular</a:t>
             </a:r>
             <a:endParaRPr lang="en-US" sz="2200" dirty="0"/>
+          </a:p>
+        </p:txBody>
+      </p:sp>
+      <p:sp>
+        <p:nvSpPr>
+          <p:cNvPr id="22" name="Retângulo 21"/>
+          <p:cNvSpPr/>
+          <p:nvPr/>
+        </p:nvSpPr>
+        <p:spPr>
+          <a:xfrm>
+            <a:off x="2092249" y="5008049"/>
+            <a:ext cx="1396018" cy="581107"/>
+          </a:xfrm>
+          <a:prstGeom prst="rect">
+            <a:avLst/>
+          </a:prstGeom>
+        </p:spPr>
+        <p:style>
+          <a:lnRef idx="2">
+            <a:schemeClr val="accent2">
+              <a:shade val="50000"/>
+            </a:schemeClr>
+          </a:lnRef>
+          <a:fillRef idx="1">
+            <a:schemeClr val="accent2"/>
+          </a:fillRef>
+          <a:effectRef idx="0">
+            <a:schemeClr val="accent2"/>
+          </a:effectRef>
+          <a:fontRef idx="minor">
+            <a:schemeClr val="lt1"/>
+          </a:fontRef>
+        </p:style>
+        <p:txBody>
+          <a:bodyPr rtlCol="0" anchor="ctr"/>
+          <a:lstStyle/>
+          <a:p>
+            <a:pPr algn="ctr"/>
+            <a:r>
+              <a:rPr lang="pt-BR" dirty="0" smtClean="0"/>
+              <a:t>Categoria</a:t>
+            </a:r>
+            <a:endParaRPr lang="pt-BR" dirty="0"/>
+          </a:p>
+        </p:txBody>
+      </p:sp>
+      <p:sp>
+        <p:nvSpPr>
+          <p:cNvPr id="23" name="Retângulo 22"/>
+          <p:cNvSpPr/>
+          <p:nvPr/>
+        </p:nvSpPr>
+        <p:spPr>
+          <a:xfrm>
+            <a:off x="3688119" y="5036542"/>
+            <a:ext cx="1396018" cy="581107"/>
+          </a:xfrm>
+          <a:prstGeom prst="rect">
+            <a:avLst/>
+          </a:prstGeom>
+        </p:spPr>
+        <p:style>
+          <a:lnRef idx="2">
+            <a:schemeClr val="accent2">
+              <a:shade val="50000"/>
+            </a:schemeClr>
+          </a:lnRef>
+          <a:fillRef idx="1">
+            <a:schemeClr val="accent2"/>
+          </a:fillRef>
+          <a:effectRef idx="0">
+            <a:schemeClr val="accent2"/>
+          </a:effectRef>
+          <a:fontRef idx="minor">
+            <a:schemeClr val="lt1"/>
+          </a:fontRef>
+        </p:style>
+        <p:txBody>
+          <a:bodyPr rtlCol="0" anchor="ctr"/>
+          <a:lstStyle/>
+          <a:p>
+            <a:pPr algn="ctr"/>
+            <a:r>
+              <a:rPr lang="pt-BR" dirty="0" smtClean="0"/>
+              <a:t>Produto</a:t>
+            </a:r>
+            <a:endParaRPr lang="pt-BR" dirty="0"/>
           </a:p>
         </p:txBody>
       </p:sp>
@@ -7364,7 +7448,7 @@
                 <a16:creationId xmlns:a16="http://schemas.microsoft.com/office/drawing/2014/main" id="{5E8D3B17-7638-DFD3-18E4-8A6D611749CF}"/>
               </a:ext>
               <a:ext uri="{C183D7F6-B498-43B3-948B-1728B52AA6E4}">
-                <adec:decorative xmlns="" xmlns:adec="http://schemas.microsoft.com/office/drawing/2017/decorative" val="1"/>
+                <adec:decorative xmlns:adec="http://schemas.microsoft.com/office/drawing/2017/decorative" xmlns="" val="1"/>
               </a:ext>
             </a:extLst>
           </p:cNvPr>
@@ -7799,7 +7883,7 @@
                 <a16:creationId xmlns:a16="http://schemas.microsoft.com/office/drawing/2014/main" id="{B8ADE68D-5E75-5D63-4B8C-6BEFCE9D06E3}"/>
               </a:ext>
               <a:ext uri="{C183D7F6-B498-43B3-948B-1728B52AA6E4}">
-                <adec:decorative xmlns="" xmlns:adec="http://schemas.microsoft.com/office/drawing/2017/decorative" val="1"/>
+                <adec:decorative xmlns:adec="http://schemas.microsoft.com/office/drawing/2017/decorative" xmlns="" val="1"/>
               </a:ext>
             </a:extLst>
           </p:cNvPr>
@@ -7885,13 +7969,13 @@
         </p:nvSpPr>
         <p:spPr>
           <a:xfrm>
-            <a:off x="468503" y="-214884"/>
-            <a:ext cx="10517176" cy="1527048"/>
+            <a:off x="429010" y="164470"/>
+            <a:ext cx="10517176" cy="463685"/>
           </a:xfrm>
         </p:spPr>
         <p:txBody>
           <a:bodyPr vert="horz" lIns="91440" tIns="45720" rIns="91440" bIns="45720" rtlCol="0" anchor="b">
-            <a:normAutofit/>
+            <a:normAutofit fontScale="90000"/>
           </a:bodyPr>
           <a:lstStyle/>
           <a:p>
@@ -7930,7 +8014,7 @@
         <p:spPr>
           <a:xfrm>
             <a:off x="3442951" y="4073931"/>
-            <a:ext cx="1687133" cy="888642"/>
+            <a:ext cx="2424448" cy="888642"/>
           </a:xfrm>
           <a:prstGeom prst="rect">
             <a:avLst/>
@@ -7978,7 +8062,7 @@
         </p:nvSpPr>
         <p:spPr>
           <a:xfrm>
-            <a:off x="1229932" y="1804037"/>
+            <a:off x="1207393" y="1775057"/>
             <a:ext cx="1687133" cy="888642"/>
           </a:xfrm>
           <a:prstGeom prst="rect">
@@ -8188,6 +8272,1262 @@
         <p:spPr>
           <a:xfrm>
             <a:off x="2807056" y="4657538"/>
+            <a:ext cx="1931832" cy="369332"/>
+          </a:xfrm>
+          <a:prstGeom prst="rect">
+            <a:avLst/>
+          </a:prstGeom>
+          <a:noFill/>
+        </p:spPr>
+        <p:txBody>
+          <a:bodyPr wrap="square">
+            <a:spAutoFit/>
+          </a:bodyPr>
+          <a:lstStyle/>
+          <a:p>
+            <a:r>
+              <a:rPr lang="pt-BR" dirty="0"/>
+              <a:t>N</a:t>
+            </a:r>
+          </a:p>
+        </p:txBody>
+      </p:sp>
+      <p:sp>
+        <p:nvSpPr>
+          <p:cNvPr id="11" name="Retângulo 10">
+            <a:extLst>
+              <a:ext uri="{FF2B5EF4-FFF2-40B4-BE49-F238E27FC236}">
+                <a16:creationId xmlns:a16="http://schemas.microsoft.com/office/drawing/2014/main" id="{39E8B432-F54E-ED48-B2A1-9E05B0A0AC60}"/>
+              </a:ext>
+            </a:extLst>
+          </p:cNvPr>
+          <p:cNvSpPr/>
+          <p:nvPr/>
+        </p:nvSpPr>
+        <p:spPr>
+          <a:xfrm>
+            <a:off x="7325791" y="2296594"/>
+            <a:ext cx="2190742" cy="888642"/>
+          </a:xfrm>
+          <a:prstGeom prst="rect">
+            <a:avLst/>
+          </a:prstGeom>
+        </p:spPr>
+        <p:style>
+          <a:lnRef idx="2">
+            <a:schemeClr val="accent1">
+              <a:shade val="15000"/>
+            </a:schemeClr>
+          </a:lnRef>
+          <a:fillRef idx="1">
+            <a:schemeClr val="accent1"/>
+          </a:fillRef>
+          <a:effectRef idx="0">
+            <a:schemeClr val="accent1"/>
+          </a:effectRef>
+          <a:fontRef idx="minor">
+            <a:schemeClr val="lt1"/>
+          </a:fontRef>
+        </p:style>
+        <p:txBody>
+          <a:bodyPr rtlCol="0" anchor="ctr"/>
+          <a:lstStyle/>
+          <a:p>
+            <a:pPr algn="ctr"/>
+            <a:r>
+              <a:rPr lang="pt-BR" dirty="0" smtClean="0"/>
+              <a:t>ENTRADA</a:t>
+            </a:r>
+            <a:endParaRPr lang="pt-BR" dirty="0"/>
+          </a:p>
+        </p:txBody>
+      </p:sp>
+      <p:sp>
+        <p:nvSpPr>
+          <p:cNvPr id="12" name="Retângulo 11">
+            <a:extLst>
+              <a:ext uri="{FF2B5EF4-FFF2-40B4-BE49-F238E27FC236}">
+                <a16:creationId xmlns:a16="http://schemas.microsoft.com/office/drawing/2014/main" id="{39E8B432-F54E-ED48-B2A1-9E05B0A0AC60}"/>
+              </a:ext>
+            </a:extLst>
+          </p:cNvPr>
+          <p:cNvSpPr/>
+          <p:nvPr/>
+        </p:nvSpPr>
+        <p:spPr>
+          <a:xfrm>
+            <a:off x="7506662" y="5748917"/>
+            <a:ext cx="2226656" cy="888642"/>
+          </a:xfrm>
+          <a:prstGeom prst="rect">
+            <a:avLst/>
+          </a:prstGeom>
+        </p:spPr>
+        <p:style>
+          <a:lnRef idx="2">
+            <a:schemeClr val="accent1">
+              <a:shade val="15000"/>
+            </a:schemeClr>
+          </a:lnRef>
+          <a:fillRef idx="1">
+            <a:schemeClr val="accent1"/>
+          </a:fillRef>
+          <a:effectRef idx="0">
+            <a:schemeClr val="accent1"/>
+          </a:effectRef>
+          <a:fontRef idx="minor">
+            <a:schemeClr val="lt1"/>
+          </a:fontRef>
+        </p:style>
+        <p:txBody>
+          <a:bodyPr rtlCol="0" anchor="ctr"/>
+          <a:lstStyle/>
+          <a:p>
+            <a:pPr algn="ctr"/>
+            <a:r>
+              <a:rPr lang="pt-BR" dirty="0" smtClean="0"/>
+              <a:t>SAIDA</a:t>
+            </a:r>
+            <a:endParaRPr lang="pt-BR" dirty="0"/>
+          </a:p>
+        </p:txBody>
+      </p:sp>
+      <p:sp>
+        <p:nvSpPr>
+          <p:cNvPr id="13" name="Retângulo 12">
+            <a:extLst>
+              <a:ext uri="{FF2B5EF4-FFF2-40B4-BE49-F238E27FC236}">
+                <a16:creationId xmlns:a16="http://schemas.microsoft.com/office/drawing/2014/main" id="{39E8B432-F54E-ED48-B2A1-9E05B0A0AC60}"/>
+              </a:ext>
+            </a:extLst>
+          </p:cNvPr>
+          <p:cNvSpPr/>
+          <p:nvPr/>
+        </p:nvSpPr>
+        <p:spPr>
+          <a:xfrm>
+            <a:off x="3509353" y="2278576"/>
+            <a:ext cx="2358046" cy="888642"/>
+          </a:xfrm>
+          <a:prstGeom prst="rect">
+            <a:avLst/>
+          </a:prstGeom>
+        </p:spPr>
+        <p:style>
+          <a:lnRef idx="2">
+            <a:schemeClr val="accent1">
+              <a:shade val="15000"/>
+            </a:schemeClr>
+          </a:lnRef>
+          <a:fillRef idx="1">
+            <a:schemeClr val="accent1"/>
+          </a:fillRef>
+          <a:effectRef idx="0">
+            <a:schemeClr val="accent1"/>
+          </a:effectRef>
+          <a:fontRef idx="minor">
+            <a:schemeClr val="lt1"/>
+          </a:fontRef>
+        </p:style>
+        <p:txBody>
+          <a:bodyPr rtlCol="0" anchor="ctr"/>
+          <a:lstStyle/>
+          <a:p>
+            <a:pPr algn="ctr"/>
+            <a:r>
+              <a:rPr lang="pt-BR" dirty="0" smtClean="0"/>
+              <a:t>ITENSENTRADA</a:t>
+            </a:r>
+            <a:endParaRPr lang="pt-BR" dirty="0"/>
+          </a:p>
+        </p:txBody>
+      </p:sp>
+      <p:sp>
+        <p:nvSpPr>
+          <p:cNvPr id="15" name="Retângulo 14">
+            <a:extLst>
+              <a:ext uri="{FF2B5EF4-FFF2-40B4-BE49-F238E27FC236}">
+                <a16:creationId xmlns:a16="http://schemas.microsoft.com/office/drawing/2014/main" id="{39E8B432-F54E-ED48-B2A1-9E05B0A0AC60}"/>
+              </a:ext>
+            </a:extLst>
+          </p:cNvPr>
+          <p:cNvSpPr/>
+          <p:nvPr/>
+        </p:nvSpPr>
+        <p:spPr>
+          <a:xfrm>
+            <a:off x="9206363" y="201028"/>
+            <a:ext cx="2190742" cy="888642"/>
+          </a:xfrm>
+          <a:prstGeom prst="rect">
+            <a:avLst/>
+          </a:prstGeom>
+        </p:spPr>
+        <p:style>
+          <a:lnRef idx="2">
+            <a:schemeClr val="accent1">
+              <a:shade val="15000"/>
+            </a:schemeClr>
+          </a:lnRef>
+          <a:fillRef idx="1">
+            <a:schemeClr val="accent1"/>
+          </a:fillRef>
+          <a:effectRef idx="0">
+            <a:schemeClr val="accent1"/>
+          </a:effectRef>
+          <a:fontRef idx="minor">
+            <a:schemeClr val="lt1"/>
+          </a:fontRef>
+        </p:style>
+        <p:txBody>
+          <a:bodyPr rtlCol="0" anchor="ctr"/>
+          <a:lstStyle/>
+          <a:p>
+            <a:pPr algn="ctr"/>
+            <a:r>
+              <a:rPr lang="pt-BR" dirty="0" smtClean="0"/>
+              <a:t>FORNECEDOR</a:t>
+            </a:r>
+            <a:endParaRPr lang="pt-BR" dirty="0"/>
+          </a:p>
+        </p:txBody>
+      </p:sp>
+      <p:sp>
+        <p:nvSpPr>
+          <p:cNvPr id="16" name="Retângulo 15">
+            <a:extLst>
+              <a:ext uri="{FF2B5EF4-FFF2-40B4-BE49-F238E27FC236}">
+                <a16:creationId xmlns:a16="http://schemas.microsoft.com/office/drawing/2014/main" id="{39E8B432-F54E-ED48-B2A1-9E05B0A0AC60}"/>
+              </a:ext>
+            </a:extLst>
+          </p:cNvPr>
+          <p:cNvSpPr/>
+          <p:nvPr/>
+        </p:nvSpPr>
+        <p:spPr>
+          <a:xfrm>
+            <a:off x="3476152" y="5869286"/>
+            <a:ext cx="2358046" cy="888642"/>
+          </a:xfrm>
+          <a:prstGeom prst="rect">
+            <a:avLst/>
+          </a:prstGeom>
+        </p:spPr>
+        <p:style>
+          <a:lnRef idx="2">
+            <a:schemeClr val="accent1">
+              <a:shade val="15000"/>
+            </a:schemeClr>
+          </a:lnRef>
+          <a:fillRef idx="1">
+            <a:schemeClr val="accent1"/>
+          </a:fillRef>
+          <a:effectRef idx="0">
+            <a:schemeClr val="accent1"/>
+          </a:effectRef>
+          <a:fontRef idx="minor">
+            <a:schemeClr val="lt1"/>
+          </a:fontRef>
+        </p:style>
+        <p:txBody>
+          <a:bodyPr rtlCol="0" anchor="ctr"/>
+          <a:lstStyle/>
+          <a:p>
+            <a:pPr algn="ctr"/>
+            <a:r>
+              <a:rPr lang="pt-BR" dirty="0" smtClean="0"/>
+              <a:t>ITENSSAIDA</a:t>
+            </a:r>
+            <a:endParaRPr lang="pt-BR" dirty="0"/>
+          </a:p>
+        </p:txBody>
+      </p:sp>
+      <p:sp>
+        <p:nvSpPr>
+          <p:cNvPr id="21" name="Retângulo 20">
+            <a:extLst>
+              <a:ext uri="{FF2B5EF4-FFF2-40B4-BE49-F238E27FC236}">
+                <a16:creationId xmlns:a16="http://schemas.microsoft.com/office/drawing/2014/main" id="{39E8B432-F54E-ED48-B2A1-9E05B0A0AC60}"/>
+              </a:ext>
+            </a:extLst>
+          </p:cNvPr>
+          <p:cNvSpPr/>
+          <p:nvPr/>
+        </p:nvSpPr>
+        <p:spPr>
+          <a:xfrm>
+            <a:off x="9581212" y="3953562"/>
+            <a:ext cx="2226656" cy="888642"/>
+          </a:xfrm>
+          <a:prstGeom prst="rect">
+            <a:avLst/>
+          </a:prstGeom>
+        </p:spPr>
+        <p:style>
+          <a:lnRef idx="2">
+            <a:schemeClr val="accent1">
+              <a:shade val="15000"/>
+            </a:schemeClr>
+          </a:lnRef>
+          <a:fillRef idx="1">
+            <a:schemeClr val="accent1"/>
+          </a:fillRef>
+          <a:effectRef idx="0">
+            <a:schemeClr val="accent1"/>
+          </a:effectRef>
+          <a:fontRef idx="minor">
+            <a:schemeClr val="lt1"/>
+          </a:fontRef>
+        </p:style>
+        <p:txBody>
+          <a:bodyPr rtlCol="0" anchor="ctr"/>
+          <a:lstStyle/>
+          <a:p>
+            <a:pPr algn="ctr"/>
+            <a:r>
+              <a:rPr lang="pt-BR" dirty="0" smtClean="0"/>
+              <a:t>SECRETARIA</a:t>
+            </a:r>
+            <a:endParaRPr lang="pt-BR" dirty="0"/>
+          </a:p>
+        </p:txBody>
+      </p:sp>
+      <p:sp>
+        <p:nvSpPr>
+          <p:cNvPr id="22" name="Losango 21">
+            <a:extLst>
+              <a:ext uri="{FF2B5EF4-FFF2-40B4-BE49-F238E27FC236}">
+                <a16:creationId xmlns:a16="http://schemas.microsoft.com/office/drawing/2014/main" id="{A0589B58-71D4-387F-B6FD-C4BBFC5DFE56}"/>
+              </a:ext>
+            </a:extLst>
+          </p:cNvPr>
+          <p:cNvSpPr/>
+          <p:nvPr/>
+        </p:nvSpPr>
+        <p:spPr>
+          <a:xfrm>
+            <a:off x="4262369" y="5131559"/>
+            <a:ext cx="785611" cy="647904"/>
+          </a:xfrm>
+          <a:prstGeom prst="diamond">
+            <a:avLst/>
+          </a:prstGeom>
+        </p:spPr>
+        <p:style>
+          <a:lnRef idx="2">
+            <a:schemeClr val="accent1">
+              <a:shade val="15000"/>
+            </a:schemeClr>
+          </a:lnRef>
+          <a:fillRef idx="1">
+            <a:schemeClr val="accent1"/>
+          </a:fillRef>
+          <a:effectRef idx="0">
+            <a:schemeClr val="accent1"/>
+          </a:effectRef>
+          <a:fontRef idx="minor">
+            <a:schemeClr val="lt1"/>
+          </a:fontRef>
+        </p:style>
+        <p:txBody>
+          <a:bodyPr rtlCol="0" anchor="ctr"/>
+          <a:lstStyle/>
+          <a:p>
+            <a:pPr algn="ctr"/>
+            <a:endParaRPr lang="pt-BR" dirty="0"/>
+          </a:p>
+        </p:txBody>
+      </p:sp>
+      <p:sp>
+        <p:nvSpPr>
+          <p:cNvPr id="23" name="Losango 22">
+            <a:extLst>
+              <a:ext uri="{FF2B5EF4-FFF2-40B4-BE49-F238E27FC236}">
+                <a16:creationId xmlns:a16="http://schemas.microsoft.com/office/drawing/2014/main" id="{A0589B58-71D4-387F-B6FD-C4BBFC5DFE56}"/>
+              </a:ext>
+            </a:extLst>
+          </p:cNvPr>
+          <p:cNvSpPr/>
+          <p:nvPr/>
+        </p:nvSpPr>
+        <p:spPr>
+          <a:xfrm>
+            <a:off x="6254858" y="5989655"/>
+            <a:ext cx="785611" cy="647904"/>
+          </a:xfrm>
+          <a:prstGeom prst="diamond">
+            <a:avLst/>
+          </a:prstGeom>
+        </p:spPr>
+        <p:style>
+          <a:lnRef idx="2">
+            <a:schemeClr val="accent1">
+              <a:shade val="15000"/>
+            </a:schemeClr>
+          </a:lnRef>
+          <a:fillRef idx="1">
+            <a:schemeClr val="accent1"/>
+          </a:fillRef>
+          <a:effectRef idx="0">
+            <a:schemeClr val="accent1"/>
+          </a:effectRef>
+          <a:fontRef idx="minor">
+            <a:schemeClr val="lt1"/>
+          </a:fontRef>
+        </p:style>
+        <p:txBody>
+          <a:bodyPr rtlCol="0" anchor="ctr"/>
+          <a:lstStyle/>
+          <a:p>
+            <a:pPr algn="ctr"/>
+            <a:endParaRPr lang="pt-BR" dirty="0"/>
+          </a:p>
+        </p:txBody>
+      </p:sp>
+      <p:sp>
+        <p:nvSpPr>
+          <p:cNvPr id="24" name="Losango 23">
+            <a:extLst>
+              <a:ext uri="{FF2B5EF4-FFF2-40B4-BE49-F238E27FC236}">
+                <a16:creationId xmlns:a16="http://schemas.microsoft.com/office/drawing/2014/main" id="{A0589B58-71D4-387F-B6FD-C4BBFC5DFE56}"/>
+              </a:ext>
+            </a:extLst>
+          </p:cNvPr>
+          <p:cNvSpPr/>
+          <p:nvPr/>
+        </p:nvSpPr>
+        <p:spPr>
+          <a:xfrm>
+            <a:off x="10301734" y="5612760"/>
+            <a:ext cx="785611" cy="647904"/>
+          </a:xfrm>
+          <a:prstGeom prst="diamond">
+            <a:avLst/>
+          </a:prstGeom>
+        </p:spPr>
+        <p:style>
+          <a:lnRef idx="2">
+            <a:schemeClr val="accent1">
+              <a:shade val="15000"/>
+            </a:schemeClr>
+          </a:lnRef>
+          <a:fillRef idx="1">
+            <a:schemeClr val="accent1"/>
+          </a:fillRef>
+          <a:effectRef idx="0">
+            <a:schemeClr val="accent1"/>
+          </a:effectRef>
+          <a:fontRef idx="minor">
+            <a:schemeClr val="lt1"/>
+          </a:fontRef>
+        </p:style>
+        <p:txBody>
+          <a:bodyPr rtlCol="0" anchor="ctr"/>
+          <a:lstStyle/>
+          <a:p>
+            <a:pPr algn="ctr"/>
+            <a:endParaRPr lang="pt-BR" dirty="0"/>
+          </a:p>
+        </p:txBody>
+      </p:sp>
+      <p:sp>
+        <p:nvSpPr>
+          <p:cNvPr id="25" name="Losango 24">
+            <a:extLst>
+              <a:ext uri="{FF2B5EF4-FFF2-40B4-BE49-F238E27FC236}">
+                <a16:creationId xmlns:a16="http://schemas.microsoft.com/office/drawing/2014/main" id="{A0589B58-71D4-387F-B6FD-C4BBFC5DFE56}"/>
+              </a:ext>
+            </a:extLst>
+          </p:cNvPr>
+          <p:cNvSpPr/>
+          <p:nvPr/>
+        </p:nvSpPr>
+        <p:spPr>
+          <a:xfrm>
+            <a:off x="10160575" y="2354237"/>
+            <a:ext cx="785611" cy="647904"/>
+          </a:xfrm>
+          <a:prstGeom prst="diamond">
+            <a:avLst/>
+          </a:prstGeom>
+        </p:spPr>
+        <p:style>
+          <a:lnRef idx="2">
+            <a:schemeClr val="accent1">
+              <a:shade val="15000"/>
+            </a:schemeClr>
+          </a:lnRef>
+          <a:fillRef idx="1">
+            <a:schemeClr val="accent1"/>
+          </a:fillRef>
+          <a:effectRef idx="0">
+            <a:schemeClr val="accent1"/>
+          </a:effectRef>
+          <a:fontRef idx="minor">
+            <a:schemeClr val="lt1"/>
+          </a:fontRef>
+        </p:style>
+        <p:txBody>
+          <a:bodyPr rtlCol="0" anchor="ctr"/>
+          <a:lstStyle/>
+          <a:p>
+            <a:pPr algn="ctr"/>
+            <a:endParaRPr lang="pt-BR" dirty="0"/>
+          </a:p>
+        </p:txBody>
+      </p:sp>
+      <p:sp>
+        <p:nvSpPr>
+          <p:cNvPr id="26" name="Losango 25">
+            <a:extLst>
+              <a:ext uri="{FF2B5EF4-FFF2-40B4-BE49-F238E27FC236}">
+                <a16:creationId xmlns:a16="http://schemas.microsoft.com/office/drawing/2014/main" id="{A0589B58-71D4-387F-B6FD-C4BBFC5DFE56}"/>
+              </a:ext>
+            </a:extLst>
+          </p:cNvPr>
+          <p:cNvSpPr/>
+          <p:nvPr/>
+        </p:nvSpPr>
+        <p:spPr>
+          <a:xfrm>
+            <a:off x="6060807" y="2416963"/>
+            <a:ext cx="785611" cy="647904"/>
+          </a:xfrm>
+          <a:prstGeom prst="diamond">
+            <a:avLst/>
+          </a:prstGeom>
+        </p:spPr>
+        <p:style>
+          <a:lnRef idx="2">
+            <a:schemeClr val="accent1">
+              <a:shade val="15000"/>
+            </a:schemeClr>
+          </a:lnRef>
+          <a:fillRef idx="1">
+            <a:schemeClr val="accent1"/>
+          </a:fillRef>
+          <a:effectRef idx="0">
+            <a:schemeClr val="accent1"/>
+          </a:effectRef>
+          <a:fontRef idx="minor">
+            <a:schemeClr val="lt1"/>
+          </a:fontRef>
+        </p:style>
+        <p:txBody>
+          <a:bodyPr rtlCol="0" anchor="ctr"/>
+          <a:lstStyle/>
+          <a:p>
+            <a:pPr algn="ctr"/>
+            <a:endParaRPr lang="pt-BR" dirty="0"/>
+          </a:p>
+        </p:txBody>
+      </p:sp>
+      <p:cxnSp>
+        <p:nvCxnSpPr>
+          <p:cNvPr id="27" name="Conector reto 26">
+            <a:extLst>
+              <a:ext uri="{FF2B5EF4-FFF2-40B4-BE49-F238E27FC236}">
+                <a16:creationId xmlns:a16="http://schemas.microsoft.com/office/drawing/2014/main" id="{6BF6B5B1-6280-4467-738C-9F23631C322C}"/>
+              </a:ext>
+            </a:extLst>
+          </p:cNvPr>
+          <p:cNvCxnSpPr/>
+          <p:nvPr/>
+        </p:nvCxnSpPr>
+        <p:spPr>
+          <a:xfrm flipV="1">
+            <a:off x="5846701" y="2749793"/>
+            <a:ext cx="1601924" cy="1"/>
+          </a:xfrm>
+          <a:prstGeom prst="line">
+            <a:avLst/>
+          </a:prstGeom>
+        </p:spPr>
+        <p:style>
+          <a:lnRef idx="1">
+            <a:schemeClr val="accent1"/>
+          </a:lnRef>
+          <a:fillRef idx="0">
+            <a:schemeClr val="accent1"/>
+          </a:fillRef>
+          <a:effectRef idx="0">
+            <a:schemeClr val="accent1"/>
+          </a:effectRef>
+          <a:fontRef idx="minor">
+            <a:schemeClr val="tx1"/>
+          </a:fontRef>
+        </p:style>
+      </p:cxnSp>
+      <p:cxnSp>
+        <p:nvCxnSpPr>
+          <p:cNvPr id="28" name="Conector reto 27">
+            <a:extLst>
+              <a:ext uri="{FF2B5EF4-FFF2-40B4-BE49-F238E27FC236}">
+                <a16:creationId xmlns:a16="http://schemas.microsoft.com/office/drawing/2014/main" id="{6BF6B5B1-6280-4467-738C-9F23631C322C}"/>
+              </a:ext>
+            </a:extLst>
+          </p:cNvPr>
+          <p:cNvCxnSpPr/>
+          <p:nvPr/>
+        </p:nvCxnSpPr>
+        <p:spPr>
+          <a:xfrm flipV="1">
+            <a:off x="5723867" y="6313607"/>
+            <a:ext cx="1782795" cy="2"/>
+          </a:xfrm>
+          <a:prstGeom prst="line">
+            <a:avLst/>
+          </a:prstGeom>
+        </p:spPr>
+        <p:style>
+          <a:lnRef idx="1">
+            <a:schemeClr val="accent1"/>
+          </a:lnRef>
+          <a:fillRef idx="0">
+            <a:schemeClr val="accent1"/>
+          </a:fillRef>
+          <a:effectRef idx="0">
+            <a:schemeClr val="accent1"/>
+          </a:effectRef>
+          <a:fontRef idx="minor">
+            <a:schemeClr val="tx1"/>
+          </a:fontRef>
+        </p:style>
+      </p:cxnSp>
+      <p:cxnSp>
+        <p:nvCxnSpPr>
+          <p:cNvPr id="29" name="Conector reto 28">
+            <a:extLst>
+              <a:ext uri="{FF2B5EF4-FFF2-40B4-BE49-F238E27FC236}">
+                <a16:creationId xmlns:a16="http://schemas.microsoft.com/office/drawing/2014/main" id="{6BF6B5B1-6280-4467-738C-9F23631C322C}"/>
+              </a:ext>
+            </a:extLst>
+          </p:cNvPr>
+          <p:cNvCxnSpPr/>
+          <p:nvPr/>
+        </p:nvCxnSpPr>
+        <p:spPr>
+          <a:xfrm flipV="1">
+            <a:off x="9017559" y="6064918"/>
+            <a:ext cx="1782795" cy="2"/>
+          </a:xfrm>
+          <a:prstGeom prst="line">
+            <a:avLst/>
+          </a:prstGeom>
+        </p:spPr>
+        <p:style>
+          <a:lnRef idx="1">
+            <a:schemeClr val="accent1"/>
+          </a:lnRef>
+          <a:fillRef idx="0">
+            <a:schemeClr val="accent1"/>
+          </a:fillRef>
+          <a:effectRef idx="0">
+            <a:schemeClr val="accent1"/>
+          </a:effectRef>
+          <a:fontRef idx="minor">
+            <a:schemeClr val="tx1"/>
+          </a:fontRef>
+        </p:style>
+      </p:cxnSp>
+      <p:cxnSp>
+        <p:nvCxnSpPr>
+          <p:cNvPr id="30" name="Conector reto 29">
+            <a:extLst>
+              <a:ext uri="{FF2B5EF4-FFF2-40B4-BE49-F238E27FC236}">
+                <a16:creationId xmlns:a16="http://schemas.microsoft.com/office/drawing/2014/main" id="{6BF6B5B1-6280-4467-738C-9F23631C322C}"/>
+              </a:ext>
+            </a:extLst>
+          </p:cNvPr>
+          <p:cNvCxnSpPr/>
+          <p:nvPr/>
+        </p:nvCxnSpPr>
+        <p:spPr>
+          <a:xfrm flipH="1" flipV="1">
+            <a:off x="10673987" y="4364412"/>
+            <a:ext cx="1" cy="1501621"/>
+          </a:xfrm>
+          <a:prstGeom prst="line">
+            <a:avLst/>
+          </a:prstGeom>
+        </p:spPr>
+        <p:style>
+          <a:lnRef idx="1">
+            <a:schemeClr val="accent1"/>
+          </a:lnRef>
+          <a:fillRef idx="0">
+            <a:schemeClr val="accent1"/>
+          </a:fillRef>
+          <a:effectRef idx="0">
+            <a:schemeClr val="accent1"/>
+          </a:effectRef>
+          <a:fontRef idx="minor">
+            <a:schemeClr val="tx1"/>
+          </a:fontRef>
+        </p:style>
+      </p:cxnSp>
+      <p:cxnSp>
+        <p:nvCxnSpPr>
+          <p:cNvPr id="31" name="Conector reto 30">
+            <a:extLst>
+              <a:ext uri="{FF2B5EF4-FFF2-40B4-BE49-F238E27FC236}">
+                <a16:creationId xmlns:a16="http://schemas.microsoft.com/office/drawing/2014/main" id="{6BF6B5B1-6280-4467-738C-9F23631C322C}"/>
+              </a:ext>
+            </a:extLst>
+          </p:cNvPr>
+          <p:cNvCxnSpPr>
+            <a:stCxn id="25" idx="2"/>
+          </p:cNvCxnSpPr>
+          <p:nvPr/>
+        </p:nvCxnSpPr>
+        <p:spPr>
+          <a:xfrm flipV="1">
+            <a:off x="10553381" y="1127717"/>
+            <a:ext cx="0" cy="1874424"/>
+          </a:xfrm>
+          <a:prstGeom prst="line">
+            <a:avLst/>
+          </a:prstGeom>
+        </p:spPr>
+        <p:style>
+          <a:lnRef idx="1">
+            <a:schemeClr val="accent1"/>
+          </a:lnRef>
+          <a:fillRef idx="0">
+            <a:schemeClr val="accent1"/>
+          </a:fillRef>
+          <a:effectRef idx="0">
+            <a:schemeClr val="accent1"/>
+          </a:effectRef>
+          <a:fontRef idx="minor">
+            <a:schemeClr val="tx1"/>
+          </a:fontRef>
+        </p:style>
+      </p:cxnSp>
+      <p:cxnSp>
+        <p:nvCxnSpPr>
+          <p:cNvPr id="32" name="Conector reto 31">
+            <a:extLst>
+              <a:ext uri="{FF2B5EF4-FFF2-40B4-BE49-F238E27FC236}">
+                <a16:creationId xmlns:a16="http://schemas.microsoft.com/office/drawing/2014/main" id="{6BF6B5B1-6280-4467-738C-9F23631C322C}"/>
+              </a:ext>
+            </a:extLst>
+          </p:cNvPr>
+          <p:cNvCxnSpPr/>
+          <p:nvPr/>
+        </p:nvCxnSpPr>
+        <p:spPr>
+          <a:xfrm flipV="1">
+            <a:off x="8958309" y="2693046"/>
+            <a:ext cx="1601924" cy="1"/>
+          </a:xfrm>
+          <a:prstGeom prst="line">
+            <a:avLst/>
+          </a:prstGeom>
+        </p:spPr>
+        <p:style>
+          <a:lnRef idx="1">
+            <a:schemeClr val="accent1"/>
+          </a:lnRef>
+          <a:fillRef idx="0">
+            <a:schemeClr val="accent1"/>
+          </a:fillRef>
+          <a:effectRef idx="0">
+            <a:schemeClr val="accent1"/>
+          </a:effectRef>
+          <a:fontRef idx="minor">
+            <a:schemeClr val="tx1"/>
+          </a:fontRef>
+        </p:style>
+      </p:cxnSp>
+      <p:sp>
+        <p:nvSpPr>
+          <p:cNvPr id="34" name="Losango 33">
+            <a:extLst>
+              <a:ext uri="{FF2B5EF4-FFF2-40B4-BE49-F238E27FC236}">
+                <a16:creationId xmlns:a16="http://schemas.microsoft.com/office/drawing/2014/main" id="{A0589B58-71D4-387F-B6FD-C4BBFC5DFE56}"/>
+              </a:ext>
+            </a:extLst>
+          </p:cNvPr>
+          <p:cNvSpPr/>
+          <p:nvPr/>
+        </p:nvSpPr>
+        <p:spPr>
+          <a:xfrm>
+            <a:off x="4262369" y="3296622"/>
+            <a:ext cx="785611" cy="647904"/>
+          </a:xfrm>
+          <a:prstGeom prst="diamond">
+            <a:avLst/>
+          </a:prstGeom>
+        </p:spPr>
+        <p:style>
+          <a:lnRef idx="2">
+            <a:schemeClr val="accent1">
+              <a:shade val="15000"/>
+            </a:schemeClr>
+          </a:lnRef>
+          <a:fillRef idx="1">
+            <a:schemeClr val="accent1"/>
+          </a:fillRef>
+          <a:effectRef idx="0">
+            <a:schemeClr val="accent1"/>
+          </a:effectRef>
+          <a:fontRef idx="minor">
+            <a:schemeClr val="lt1"/>
+          </a:fontRef>
+        </p:style>
+        <p:txBody>
+          <a:bodyPr rtlCol="0" anchor="ctr"/>
+          <a:lstStyle/>
+          <a:p>
+            <a:pPr algn="ctr"/>
+            <a:endParaRPr lang="pt-BR" dirty="0"/>
+          </a:p>
+        </p:txBody>
+      </p:sp>
+      <p:cxnSp>
+        <p:nvCxnSpPr>
+          <p:cNvPr id="35" name="Conector reto 34">
+            <a:extLst>
+              <a:ext uri="{FF2B5EF4-FFF2-40B4-BE49-F238E27FC236}">
+                <a16:creationId xmlns:a16="http://schemas.microsoft.com/office/drawing/2014/main" id="{6BF6B5B1-6280-4467-738C-9F23631C322C}"/>
+              </a:ext>
+            </a:extLst>
+          </p:cNvPr>
+          <p:cNvCxnSpPr/>
+          <p:nvPr/>
+        </p:nvCxnSpPr>
+        <p:spPr>
+          <a:xfrm flipH="1" flipV="1">
+            <a:off x="4637567" y="2722897"/>
+            <a:ext cx="6853" cy="3096803"/>
+          </a:xfrm>
+          <a:prstGeom prst="line">
+            <a:avLst/>
+          </a:prstGeom>
+        </p:spPr>
+        <p:style>
+          <a:lnRef idx="1">
+            <a:schemeClr val="accent1"/>
+          </a:lnRef>
+          <a:fillRef idx="0">
+            <a:schemeClr val="accent1"/>
+          </a:fillRef>
+          <a:effectRef idx="0">
+            <a:schemeClr val="accent1"/>
+          </a:effectRef>
+          <a:fontRef idx="minor">
+            <a:schemeClr val="tx1"/>
+          </a:fontRef>
+        </p:style>
+      </p:cxnSp>
+      <p:sp>
+        <p:nvSpPr>
+          <p:cNvPr id="36" name="CaixaDeTexto 35">
+            <a:extLst>
+              <a:ext uri="{FF2B5EF4-FFF2-40B4-BE49-F238E27FC236}">
+                <a16:creationId xmlns:a16="http://schemas.microsoft.com/office/drawing/2014/main" id="{0B3999CC-C262-EF20-322E-845F60C54B47}"/>
+              </a:ext>
+            </a:extLst>
+          </p:cNvPr>
+          <p:cNvSpPr txBox="1"/>
+          <p:nvPr/>
+        </p:nvSpPr>
+        <p:spPr>
+          <a:xfrm>
+            <a:off x="5001636" y="5496701"/>
+            <a:ext cx="1931832" cy="369332"/>
+          </a:xfrm>
+          <a:prstGeom prst="rect">
+            <a:avLst/>
+          </a:prstGeom>
+          <a:noFill/>
+        </p:spPr>
+        <p:txBody>
+          <a:bodyPr wrap="square">
+            <a:spAutoFit/>
+          </a:bodyPr>
+          <a:lstStyle/>
+          <a:p>
+            <a:r>
+              <a:rPr lang="pt-BR" dirty="0"/>
+              <a:t>N</a:t>
+            </a:r>
+          </a:p>
+        </p:txBody>
+      </p:sp>
+      <p:sp>
+        <p:nvSpPr>
+          <p:cNvPr id="37" name="CaixaDeTexto 36">
+            <a:extLst>
+              <a:ext uri="{FF2B5EF4-FFF2-40B4-BE49-F238E27FC236}">
+                <a16:creationId xmlns:a16="http://schemas.microsoft.com/office/drawing/2014/main" id="{0B3999CC-C262-EF20-322E-845F60C54B47}"/>
+              </a:ext>
+            </a:extLst>
+          </p:cNvPr>
+          <p:cNvSpPr txBox="1"/>
+          <p:nvPr/>
+        </p:nvSpPr>
+        <p:spPr>
+          <a:xfrm>
+            <a:off x="4963235" y="4952310"/>
+            <a:ext cx="1931832" cy="369332"/>
+          </a:xfrm>
+          <a:prstGeom prst="rect">
+            <a:avLst/>
+          </a:prstGeom>
+          <a:noFill/>
+        </p:spPr>
+        <p:txBody>
+          <a:bodyPr wrap="square">
+            <a:spAutoFit/>
+          </a:bodyPr>
+          <a:lstStyle/>
+          <a:p>
+            <a:r>
+              <a:rPr lang="pt-BR" dirty="0" smtClean="0"/>
+              <a:t>1</a:t>
+            </a:r>
+            <a:endParaRPr lang="pt-BR" dirty="0"/>
+          </a:p>
+        </p:txBody>
+      </p:sp>
+      <p:sp>
+        <p:nvSpPr>
+          <p:cNvPr id="38" name="CaixaDeTexto 37">
+            <a:extLst>
+              <a:ext uri="{FF2B5EF4-FFF2-40B4-BE49-F238E27FC236}">
+                <a16:creationId xmlns:a16="http://schemas.microsoft.com/office/drawing/2014/main" id="{0B3999CC-C262-EF20-322E-845F60C54B47}"/>
+              </a:ext>
+            </a:extLst>
+          </p:cNvPr>
+          <p:cNvSpPr txBox="1"/>
+          <p:nvPr/>
+        </p:nvSpPr>
+        <p:spPr>
+          <a:xfrm>
+            <a:off x="4984861" y="3777427"/>
+            <a:ext cx="1931832" cy="369332"/>
+          </a:xfrm>
+          <a:prstGeom prst="rect">
+            <a:avLst/>
+          </a:prstGeom>
+          <a:noFill/>
+        </p:spPr>
+        <p:txBody>
+          <a:bodyPr wrap="square">
+            <a:spAutoFit/>
+          </a:bodyPr>
+          <a:lstStyle/>
+          <a:p>
+            <a:r>
+              <a:rPr lang="pt-BR" dirty="0" smtClean="0"/>
+              <a:t>1</a:t>
+            </a:r>
+            <a:endParaRPr lang="pt-BR" dirty="0"/>
+          </a:p>
+        </p:txBody>
+      </p:sp>
+      <p:sp>
+        <p:nvSpPr>
+          <p:cNvPr id="39" name="CaixaDeTexto 38">
+            <a:extLst>
+              <a:ext uri="{FF2B5EF4-FFF2-40B4-BE49-F238E27FC236}">
+                <a16:creationId xmlns:a16="http://schemas.microsoft.com/office/drawing/2014/main" id="{0B3999CC-C262-EF20-322E-845F60C54B47}"/>
+              </a:ext>
+            </a:extLst>
+          </p:cNvPr>
+          <p:cNvSpPr txBox="1"/>
+          <p:nvPr/>
+        </p:nvSpPr>
+        <p:spPr>
+          <a:xfrm>
+            <a:off x="4868282" y="3210052"/>
+            <a:ext cx="1931832" cy="369332"/>
+          </a:xfrm>
+          <a:prstGeom prst="rect">
+            <a:avLst/>
+          </a:prstGeom>
+          <a:noFill/>
+        </p:spPr>
+        <p:txBody>
+          <a:bodyPr wrap="square">
+            <a:spAutoFit/>
+          </a:bodyPr>
+          <a:lstStyle/>
+          <a:p>
+            <a:r>
+              <a:rPr lang="pt-BR" dirty="0"/>
+              <a:t>N</a:t>
+            </a:r>
+          </a:p>
+        </p:txBody>
+      </p:sp>
+      <p:sp>
+        <p:nvSpPr>
+          <p:cNvPr id="40" name="CaixaDeTexto 39">
+            <a:extLst>
+              <a:ext uri="{FF2B5EF4-FFF2-40B4-BE49-F238E27FC236}">
+                <a16:creationId xmlns:a16="http://schemas.microsoft.com/office/drawing/2014/main" id="{0B3999CC-C262-EF20-322E-845F60C54B47}"/>
+              </a:ext>
+            </a:extLst>
+          </p:cNvPr>
+          <p:cNvSpPr txBox="1"/>
+          <p:nvPr/>
+        </p:nvSpPr>
+        <p:spPr>
+          <a:xfrm>
+            <a:off x="7119778" y="5931624"/>
+            <a:ext cx="1931832" cy="369332"/>
+          </a:xfrm>
+          <a:prstGeom prst="rect">
+            <a:avLst/>
+          </a:prstGeom>
+          <a:noFill/>
+        </p:spPr>
+        <p:txBody>
+          <a:bodyPr wrap="square">
+            <a:spAutoFit/>
+          </a:bodyPr>
+          <a:lstStyle/>
+          <a:p>
+            <a:r>
+              <a:rPr lang="pt-BR" dirty="0" smtClean="0"/>
+              <a:t>1</a:t>
+            </a:r>
+            <a:endParaRPr lang="pt-BR" dirty="0"/>
+          </a:p>
+        </p:txBody>
+      </p:sp>
+      <p:sp>
+        <p:nvSpPr>
+          <p:cNvPr id="41" name="CaixaDeTexto 40">
+            <a:extLst>
+              <a:ext uri="{FF2B5EF4-FFF2-40B4-BE49-F238E27FC236}">
+                <a16:creationId xmlns:a16="http://schemas.microsoft.com/office/drawing/2014/main" id="{0B3999CC-C262-EF20-322E-845F60C54B47}"/>
+              </a:ext>
+            </a:extLst>
+          </p:cNvPr>
+          <p:cNvSpPr txBox="1"/>
+          <p:nvPr/>
+        </p:nvSpPr>
+        <p:spPr>
+          <a:xfrm>
+            <a:off x="5846701" y="5979716"/>
+            <a:ext cx="1931832" cy="369332"/>
+          </a:xfrm>
+          <a:prstGeom prst="rect">
+            <a:avLst/>
+          </a:prstGeom>
+          <a:noFill/>
+        </p:spPr>
+        <p:txBody>
+          <a:bodyPr wrap="square">
+            <a:spAutoFit/>
+          </a:bodyPr>
+          <a:lstStyle/>
+          <a:p>
+            <a:r>
+              <a:rPr lang="pt-BR" dirty="0"/>
+              <a:t>N</a:t>
+            </a:r>
+          </a:p>
+        </p:txBody>
+      </p:sp>
+      <p:sp>
+        <p:nvSpPr>
+          <p:cNvPr id="42" name="CaixaDeTexto 41">
+            <a:extLst>
+              <a:ext uri="{FF2B5EF4-FFF2-40B4-BE49-F238E27FC236}">
+                <a16:creationId xmlns:a16="http://schemas.microsoft.com/office/drawing/2014/main" id="{0B3999CC-C262-EF20-322E-845F60C54B47}"/>
+              </a:ext>
+            </a:extLst>
+          </p:cNvPr>
+          <p:cNvSpPr txBox="1"/>
+          <p:nvPr/>
+        </p:nvSpPr>
+        <p:spPr>
+          <a:xfrm>
+            <a:off x="5846701" y="2408153"/>
+            <a:ext cx="1931832" cy="369332"/>
+          </a:xfrm>
+          <a:prstGeom prst="rect">
+            <a:avLst/>
+          </a:prstGeom>
+          <a:noFill/>
+        </p:spPr>
+        <p:txBody>
+          <a:bodyPr wrap="square">
+            <a:spAutoFit/>
+          </a:bodyPr>
+          <a:lstStyle/>
+          <a:p>
+            <a:r>
+              <a:rPr lang="pt-BR" dirty="0"/>
+              <a:t>N</a:t>
+            </a:r>
+          </a:p>
+        </p:txBody>
+      </p:sp>
+      <p:sp>
+        <p:nvSpPr>
+          <p:cNvPr id="43" name="CaixaDeTexto 42">
+            <a:extLst>
+              <a:ext uri="{FF2B5EF4-FFF2-40B4-BE49-F238E27FC236}">
+                <a16:creationId xmlns:a16="http://schemas.microsoft.com/office/drawing/2014/main" id="{0B3999CC-C262-EF20-322E-845F60C54B47}"/>
+              </a:ext>
+            </a:extLst>
+          </p:cNvPr>
+          <p:cNvSpPr txBox="1"/>
+          <p:nvPr/>
+        </p:nvSpPr>
+        <p:spPr>
+          <a:xfrm>
+            <a:off x="6989781" y="2448197"/>
+            <a:ext cx="1931832" cy="369332"/>
+          </a:xfrm>
+          <a:prstGeom prst="rect">
+            <a:avLst/>
+          </a:prstGeom>
+          <a:noFill/>
+        </p:spPr>
+        <p:txBody>
+          <a:bodyPr wrap="square">
+            <a:spAutoFit/>
+          </a:bodyPr>
+          <a:lstStyle/>
+          <a:p>
+            <a:r>
+              <a:rPr lang="pt-BR" dirty="0" smtClean="0"/>
+              <a:t>1</a:t>
+            </a:r>
+            <a:endParaRPr lang="pt-BR" dirty="0"/>
+          </a:p>
+        </p:txBody>
+      </p:sp>
+      <p:sp>
+        <p:nvSpPr>
+          <p:cNvPr id="44" name="CaixaDeTexto 43">
+            <a:extLst>
+              <a:ext uri="{FF2B5EF4-FFF2-40B4-BE49-F238E27FC236}">
+                <a16:creationId xmlns:a16="http://schemas.microsoft.com/office/drawing/2014/main" id="{0B3999CC-C262-EF20-322E-845F60C54B47}"/>
+              </a:ext>
+            </a:extLst>
+          </p:cNvPr>
+          <p:cNvSpPr txBox="1"/>
+          <p:nvPr/>
+        </p:nvSpPr>
+        <p:spPr>
+          <a:xfrm>
+            <a:off x="10225476" y="1063199"/>
+            <a:ext cx="1931832" cy="369332"/>
+          </a:xfrm>
+          <a:prstGeom prst="rect">
+            <a:avLst/>
+          </a:prstGeom>
+          <a:noFill/>
+        </p:spPr>
+        <p:txBody>
+          <a:bodyPr wrap="square">
+            <a:spAutoFit/>
+          </a:bodyPr>
+          <a:lstStyle/>
+          <a:p>
+            <a:r>
+              <a:rPr lang="pt-BR" dirty="0" smtClean="0"/>
+              <a:t>1</a:t>
+            </a:r>
+            <a:endParaRPr lang="pt-BR" dirty="0"/>
+          </a:p>
+        </p:txBody>
+      </p:sp>
+      <p:sp>
+        <p:nvSpPr>
+          <p:cNvPr id="45" name="CaixaDeTexto 44">
+            <a:extLst>
+              <a:ext uri="{FF2B5EF4-FFF2-40B4-BE49-F238E27FC236}">
+                <a16:creationId xmlns:a16="http://schemas.microsoft.com/office/drawing/2014/main" id="{0B3999CC-C262-EF20-322E-845F60C54B47}"/>
+              </a:ext>
+            </a:extLst>
+          </p:cNvPr>
+          <p:cNvSpPr txBox="1"/>
+          <p:nvPr/>
+        </p:nvSpPr>
+        <p:spPr>
+          <a:xfrm>
+            <a:off x="9477945" y="2290472"/>
+            <a:ext cx="1931832" cy="369332"/>
+          </a:xfrm>
+          <a:prstGeom prst="rect">
+            <a:avLst/>
+          </a:prstGeom>
+          <a:noFill/>
+        </p:spPr>
+        <p:txBody>
+          <a:bodyPr wrap="square">
+            <a:spAutoFit/>
+          </a:bodyPr>
+          <a:lstStyle/>
+          <a:p>
+            <a:r>
+              <a:rPr lang="pt-BR" dirty="0"/>
+              <a:t>N</a:t>
+            </a:r>
+          </a:p>
+        </p:txBody>
+      </p:sp>
+      <p:sp>
+        <p:nvSpPr>
+          <p:cNvPr id="46" name="CaixaDeTexto 45">
+            <a:extLst>
+              <a:ext uri="{FF2B5EF4-FFF2-40B4-BE49-F238E27FC236}">
+                <a16:creationId xmlns:a16="http://schemas.microsoft.com/office/drawing/2014/main" id="{0B3999CC-C262-EF20-322E-845F60C54B47}"/>
+              </a:ext>
+            </a:extLst>
+          </p:cNvPr>
+          <p:cNvSpPr txBox="1"/>
+          <p:nvPr/>
+        </p:nvSpPr>
+        <p:spPr>
+          <a:xfrm>
+            <a:off x="10800354" y="4925030"/>
+            <a:ext cx="1931832" cy="369332"/>
+          </a:xfrm>
+          <a:prstGeom prst="rect">
+            <a:avLst/>
+          </a:prstGeom>
+          <a:noFill/>
+        </p:spPr>
+        <p:txBody>
+          <a:bodyPr wrap="square">
+            <a:spAutoFit/>
+          </a:bodyPr>
+          <a:lstStyle/>
+          <a:p>
+            <a:r>
+              <a:rPr lang="pt-BR" dirty="0" smtClean="0"/>
+              <a:t>1</a:t>
+            </a:r>
+            <a:endParaRPr lang="pt-BR" dirty="0"/>
+          </a:p>
+        </p:txBody>
+      </p:sp>
+      <p:sp>
+        <p:nvSpPr>
+          <p:cNvPr id="47" name="CaixaDeTexto 46">
+            <a:extLst>
+              <a:ext uri="{FF2B5EF4-FFF2-40B4-BE49-F238E27FC236}">
+                <a16:creationId xmlns:a16="http://schemas.microsoft.com/office/drawing/2014/main" id="{0B3999CC-C262-EF20-322E-845F60C54B47}"/>
+              </a:ext>
+            </a:extLst>
+          </p:cNvPr>
+          <p:cNvSpPr txBox="1"/>
+          <p:nvPr/>
+        </p:nvSpPr>
+        <p:spPr>
+          <a:xfrm>
+            <a:off x="9708071" y="6103810"/>
             <a:ext cx="1931832" cy="369332"/>
           </a:xfrm>
           <a:prstGeom prst="rect">
@@ -8270,7 +9610,7 @@
                 <a16:creationId xmlns:a16="http://schemas.microsoft.com/office/drawing/2014/main" id="{8450EF29-A29A-9417-2B09-074C04064425}"/>
               </a:ext>
               <a:ext uri="{C183D7F6-B498-43B3-948B-1728B52AA6E4}">
-                <adec:decorative xmlns="" xmlns:adec="http://schemas.microsoft.com/office/drawing/2017/decorative" val="1"/>
+                <adec:decorative xmlns:adec="http://schemas.microsoft.com/office/drawing/2017/decorative" xmlns="" val="1"/>
               </a:ext>
             </a:extLst>
           </p:cNvPr>
@@ -8962,7 +10302,7 @@
                 <a16:creationId xmlns:a16="http://schemas.microsoft.com/office/drawing/2014/main" id="{8450EF29-A29A-9417-2B09-074C04064425}"/>
               </a:ext>
               <a:ext uri="{C183D7F6-B498-43B3-948B-1728B52AA6E4}">
-                <adec:decorative xmlns="" xmlns:adec="http://schemas.microsoft.com/office/drawing/2017/decorative" val="1"/>
+                <adec:decorative xmlns:adec="http://schemas.microsoft.com/office/drawing/2017/decorative" xmlns="" val="1"/>
               </a:ext>
             </a:extLst>
           </p:cNvPr>
@@ -9613,7 +10953,7 @@
                 <a16:creationId xmlns:a16="http://schemas.microsoft.com/office/drawing/2014/main" id="{5E8D3B17-7638-DFD3-18E4-8A6D611749CF}"/>
               </a:ext>
               <a:ext uri="{C183D7F6-B498-43B3-948B-1728B52AA6E4}">
-                <adec:decorative xmlns="" xmlns:adec="http://schemas.microsoft.com/office/drawing/2017/decorative" val="1"/>
+                <adec:decorative xmlns:adec="http://schemas.microsoft.com/office/drawing/2017/decorative" xmlns="" val="1"/>
               </a:ext>
             </a:extLst>
           </p:cNvPr>
@@ -9773,7 +11113,7 @@
                 <a16:creationId xmlns:a16="http://schemas.microsoft.com/office/drawing/2014/main" id="{5E8D3B17-7638-DFD3-18E4-8A6D611749CF}"/>
               </a:ext>
               <a:ext uri="{C183D7F6-B498-43B3-948B-1728B52AA6E4}">
-                <adec:decorative xmlns="" xmlns:adec="http://schemas.microsoft.com/office/drawing/2017/decorative" val="1"/>
+                <adec:decorative xmlns:adec="http://schemas.microsoft.com/office/drawing/2017/decorative" xmlns="" val="1"/>
               </a:ext>
             </a:extLst>
           </p:cNvPr>
@@ -10017,7 +11357,7 @@
                 <a16:creationId xmlns:a16="http://schemas.microsoft.com/office/drawing/2014/main" id="{5E8D3B17-7638-DFD3-18E4-8A6D611749CF}"/>
               </a:ext>
               <a:ext uri="{C183D7F6-B498-43B3-948B-1728B52AA6E4}">
-                <adec:decorative xmlns="" xmlns:adec="http://schemas.microsoft.com/office/drawing/2017/decorative" val="1"/>
+                <adec:decorative xmlns:adec="http://schemas.microsoft.com/office/drawing/2017/decorative" xmlns="" val="1"/>
               </a:ext>
             </a:extLst>
           </p:cNvPr>
@@ -10884,7 +12224,7 @@
                 <a16:creationId xmlns:a16="http://schemas.microsoft.com/office/drawing/2014/main" id="{5E8D3B17-7638-DFD3-18E4-8A6D611749CF}"/>
               </a:ext>
               <a:ext uri="{C183D7F6-B498-43B3-948B-1728B52AA6E4}">
-                <adec:decorative xmlns="" xmlns:adec="http://schemas.microsoft.com/office/drawing/2017/decorative" val="1"/>
+                <adec:decorative xmlns:adec="http://schemas.microsoft.com/office/drawing/2017/decorative" xmlns="" val="1"/>
               </a:ext>
             </a:extLst>
           </p:cNvPr>
@@ -11021,7 +12361,7 @@
             <p:ph sz="half" idx="2"/>
             <p:extLst>
               <p:ext uri="{E7BDC344-281C-4309-B0C6-D0EE65EED2A8}">
-                <p202:designPr xmlns="" xmlns:p202="http://schemas.microsoft.com/office/powerpoint/2020/02/main">
+                <p202:designPr xmlns:p202="http://schemas.microsoft.com/office/powerpoint/2020/02/main" xmlns="">
                   <p202:designTagLst>
                     <p202:designTag name="ARCH:1:CLS" val="InformationBlock"/>
                     <p202:designTag name="ARCH:1:VSVAR" val="TitledTextBox"/>
@@ -11247,7 +12587,7 @@
                 <a16:creationId xmlns:a16="http://schemas.microsoft.com/office/drawing/2014/main" id="{5E8D3B17-7638-DFD3-18E4-8A6D611749CF}"/>
               </a:ext>
               <a:ext uri="{C183D7F6-B498-43B3-948B-1728B52AA6E4}">
-                <adec:decorative xmlns="" xmlns:adec="http://schemas.microsoft.com/office/drawing/2017/decorative" val="1"/>
+                <adec:decorative xmlns:adec="http://schemas.microsoft.com/office/drawing/2017/decorative" xmlns="" val="1"/>
               </a:ext>
             </a:extLst>
           </p:cNvPr>
@@ -11456,7 +12796,7 @@
             <p:ph sz="half" idx="2"/>
             <p:extLst>
               <p:ext uri="{E7BDC344-281C-4309-B0C6-D0EE65EED2A8}">
-                <p202:designPr xmlns="" xmlns:p202="http://schemas.microsoft.com/office/powerpoint/2020/02/main">
+                <p202:designPr xmlns:p202="http://schemas.microsoft.com/office/powerpoint/2020/02/main" xmlns="">
                   <p202:designTagLst>
                     <p202:designTag name="ARCH:1:CLS" val="InformationBlock"/>
                     <p202:designTag name="ARCH:1:VSVAR" val="TitledTextBox"/>
@@ -11708,7 +13048,7 @@
                 <a16:creationId xmlns:a16="http://schemas.microsoft.com/office/drawing/2014/main" id="{5E8D3B17-7638-DFD3-18E4-8A6D611749CF}"/>
               </a:ext>
               <a:ext uri="{C183D7F6-B498-43B3-948B-1728B52AA6E4}">
-                <adec:decorative xmlns="" xmlns:adec="http://schemas.microsoft.com/office/drawing/2017/decorative" val="1"/>
+                <adec:decorative xmlns:adec="http://schemas.microsoft.com/office/drawing/2017/decorative" xmlns="" val="1"/>
               </a:ext>
             </a:extLst>
           </p:cNvPr>
@@ -11835,7 +13175,7 @@
             <p:ph sz="half" idx="2"/>
             <p:extLst>
               <p:ext uri="{E7BDC344-281C-4309-B0C6-D0EE65EED2A8}">
-                <p202:designPr xmlns="" xmlns:p202="http://schemas.microsoft.com/office/powerpoint/2020/02/main">
+                <p202:designPr xmlns:p202="http://schemas.microsoft.com/office/powerpoint/2020/02/main" xmlns="">
                   <p202:designTagLst>
                     <p202:designTag name="ARCH:1:CLS" val="InformationBlock"/>
                     <p202:designTag name="ARCH:1:VSVAR" val="TitledTextBox"/>
@@ -12152,7 +13492,7 @@
                 <a16:creationId xmlns:a16="http://schemas.microsoft.com/office/drawing/2014/main" id="{E1D40FB4-97DC-F5FF-9E7A-C10E078A1532}"/>
               </a:ext>
               <a:ext uri="{C183D7F6-B498-43B3-948B-1728B52AA6E4}">
-                <adec:decorative xmlns="" xmlns:adec="http://schemas.microsoft.com/office/drawing/2017/decorative" val="1"/>
+                <adec:decorative xmlns:adec="http://schemas.microsoft.com/office/drawing/2017/decorative" xmlns="" val="1"/>
               </a:ext>
             </a:extLst>
           </p:cNvPr>
@@ -12282,7 +13622,7 @@
             <p:ph sz="half" idx="2"/>
             <p:extLst>
               <p:ext uri="{E7BDC344-281C-4309-B0C6-D0EE65EED2A8}">
-                <p202:designPr xmlns="" xmlns:p202="http://schemas.microsoft.com/office/powerpoint/2020/02/main">
+                <p202:designPr xmlns:p202="http://schemas.microsoft.com/office/powerpoint/2020/02/main" xmlns="">
                   <p202:designTagLst>
                     <p202:designTag name="ARCH:1:CLS" val="InformationBlock"/>
                     <p202:designTag name="ARCH:1:VSVAR" val="TitledTextBox"/>
@@ -12540,7 +13880,7 @@
                 <a16:creationId xmlns:a16="http://schemas.microsoft.com/office/drawing/2014/main" id="{A51D6A68-C3BD-3399-CCA8-A7290FC8E09C}"/>
               </a:ext>
               <a:ext uri="{C183D7F6-B498-43B3-948B-1728B52AA6E4}">
-                <adec:decorative xmlns="" xmlns:adec="http://schemas.microsoft.com/office/drawing/2017/decorative" val="1"/>
+                <adec:decorative xmlns:adec="http://schemas.microsoft.com/office/drawing/2017/decorative" xmlns="" val="1"/>
               </a:ext>
             </a:extLst>
           </p:cNvPr>
@@ -12668,7 +14008,7 @@
             <p:ph sz="half" idx="2"/>
             <p:extLst>
               <p:ext uri="{E7BDC344-281C-4309-B0C6-D0EE65EED2A8}">
-                <p202:designPr xmlns="" xmlns:p202="http://schemas.microsoft.com/office/powerpoint/2020/02/main">
+                <p202:designPr xmlns:p202="http://schemas.microsoft.com/office/powerpoint/2020/02/main" xmlns="">
                   <p202:designTagLst>
                     <p202:designTag name="ARCH:1:CLS" val="InformationBlock"/>
                     <p202:designTag name="ARCH:1:VSVAR" val="TitledTextBox"/>
@@ -12926,7 +14266,7 @@
                 <a16:creationId xmlns:a16="http://schemas.microsoft.com/office/drawing/2014/main" id="{7F39A533-5E9C-439F-5CF1-06FFAB778C1F}"/>
               </a:ext>
               <a:ext uri="{C183D7F6-B498-43B3-948B-1728B52AA6E4}">
-                <adec:decorative xmlns="" xmlns:adec="http://schemas.microsoft.com/office/drawing/2017/decorative" val="1"/>
+                <adec:decorative xmlns:adec="http://schemas.microsoft.com/office/drawing/2017/decorative" xmlns="" val="1"/>
               </a:ext>
             </a:extLst>
           </p:cNvPr>
@@ -13054,7 +14394,7 @@
             <p:ph sz="half" idx="2"/>
             <p:extLst>
               <p:ext uri="{E7BDC344-281C-4309-B0C6-D0EE65EED2A8}">
-                <p202:designPr xmlns="" xmlns:p202="http://schemas.microsoft.com/office/powerpoint/2020/02/main">
+                <p202:designPr xmlns:p202="http://schemas.microsoft.com/office/powerpoint/2020/02/main" xmlns="">
                   <p202:designTagLst>
                     <p202:designTag name="ARCH:1:CLS" val="InformationBlock"/>
                     <p202:designTag name="ARCH:1:VSVAR" val="TitledTextBox"/>
@@ -13327,7 +14667,7 @@
                 <a16:creationId xmlns:a16="http://schemas.microsoft.com/office/drawing/2014/main" id="{A82A2D76-411A-C189-4AD9-642686996848}"/>
               </a:ext>
               <a:ext uri="{C183D7F6-B498-43B3-948B-1728B52AA6E4}">
-                <adec:decorative xmlns="" xmlns:adec="http://schemas.microsoft.com/office/drawing/2017/decorative" val="1"/>
+                <adec:decorative xmlns:adec="http://schemas.microsoft.com/office/drawing/2017/decorative" xmlns="" val="1"/>
               </a:ext>
             </a:extLst>
           </p:cNvPr>
@@ -13455,7 +14795,7 @@
             <p:ph sz="half" idx="2"/>
             <p:extLst>
               <p:ext uri="{E7BDC344-281C-4309-B0C6-D0EE65EED2A8}">
-                <p202:designPr xmlns="" xmlns:p202="http://schemas.microsoft.com/office/powerpoint/2020/02/main">
+                <p202:designPr xmlns:p202="http://schemas.microsoft.com/office/powerpoint/2020/02/main" xmlns="">
                   <p202:designTagLst>
                     <p202:designTag name="ARCH:1:CLS" val="InformationBlock"/>
                     <p202:designTag name="ARCH:1:VSVAR" val="TitledTextBox"/>
@@ -13716,7 +15056,7 @@
                 <a16:creationId xmlns:a16="http://schemas.microsoft.com/office/drawing/2014/main" id="{E482AA53-DA69-E258-8B64-8F8CE86FCDD4}"/>
               </a:ext>
               <a:ext uri="{C183D7F6-B498-43B3-948B-1728B52AA6E4}">
-                <adec:decorative xmlns="" xmlns:adec="http://schemas.microsoft.com/office/drawing/2017/decorative" val="1"/>
+                <adec:decorative xmlns:adec="http://schemas.microsoft.com/office/drawing/2017/decorative" xmlns="" val="1"/>
               </a:ext>
             </a:extLst>
           </p:cNvPr>
@@ -13844,7 +15184,7 @@
             <p:ph sz="half" idx="2"/>
             <p:extLst>
               <p:ext uri="{E7BDC344-281C-4309-B0C6-D0EE65EED2A8}">
-                <p202:designPr xmlns="" xmlns:p202="http://schemas.microsoft.com/office/powerpoint/2020/02/main">
+                <p202:designPr xmlns:p202="http://schemas.microsoft.com/office/powerpoint/2020/02/main" xmlns="">
                   <p202:designTagLst>
                     <p202:designTag name="ARCH:1:CLS" val="InformationBlock"/>
                     <p202:designTag name="ARCH:1:VSVAR" val="TitledTextBox"/>
@@ -14120,7 +15460,7 @@
                 <a16:creationId xmlns:a16="http://schemas.microsoft.com/office/drawing/2014/main" id="{5C27E16A-554C-D4AC-900E-AA69DDAEDE03}"/>
               </a:ext>
               <a:ext uri="{C183D7F6-B498-43B3-948B-1728B52AA6E4}">
-                <adec:decorative xmlns="" xmlns:adec="http://schemas.microsoft.com/office/drawing/2017/decorative" val="1"/>
+                <adec:decorative xmlns:adec="http://schemas.microsoft.com/office/drawing/2017/decorative" xmlns="" val="1"/>
               </a:ext>
             </a:extLst>
           </p:cNvPr>
@@ -14248,7 +15588,7 @@
             <p:ph sz="half" idx="2"/>
             <p:extLst>
               <p:ext uri="{E7BDC344-281C-4309-B0C6-D0EE65EED2A8}">
-                <p202:designPr xmlns="" xmlns:p202="http://schemas.microsoft.com/office/powerpoint/2020/02/main">
+                <p202:designPr xmlns:p202="http://schemas.microsoft.com/office/powerpoint/2020/02/main" xmlns="">
                   <p202:designTagLst>
                     <p202:designTag name="ARCH:1:CLS" val="InformationBlock"/>
                     <p202:designTag name="ARCH:1:VSVAR" val="TitledTextBox"/>

</xml_diff>

<commit_message>
Configurado banco de dados
</commit_message>
<xml_diff>
--- a/Documentacao/ModelagemSistema_TemplateInicial.pptx
+++ b/Documentacao/ModelagemSistema_TemplateInicial.pptx
@@ -5683,7 +5683,7 @@
                 <a16:creationId xmlns:a16="http://schemas.microsoft.com/office/drawing/2014/main" id="{6E448DB1-4196-18A6-15DA-C72635C1B11E}"/>
               </a:ext>
               <a:ext uri="{C183D7F6-B498-43B3-948B-1728B52AA6E4}">
-                <adec:decorative xmlns:adec="http://schemas.microsoft.com/office/drawing/2017/decorative" xmlns="" val="1"/>
+                <adec:decorative xmlns="" xmlns:adec="http://schemas.microsoft.com/office/drawing/2017/decorative" val="1"/>
               </a:ext>
             </a:extLst>
           </p:cNvPr>
@@ -5791,7 +5791,7 @@
                 <a16:creationId xmlns:a16="http://schemas.microsoft.com/office/drawing/2014/main" id="{76A10D8F-D463-70E5-239B-17AD65EF433D}"/>
               </a:ext>
               <a:ext uri="{C183D7F6-B498-43B3-948B-1728B52AA6E4}">
-                <adec:decorative xmlns:adec="http://schemas.microsoft.com/office/drawing/2017/decorative" xmlns="" val="1"/>
+                <adec:decorative xmlns="" xmlns:adec="http://schemas.microsoft.com/office/drawing/2017/decorative" val="1"/>
               </a:ext>
             </a:extLst>
           </p:cNvPr>
@@ -6252,7 +6252,7 @@
                 <a16:creationId xmlns:a16="http://schemas.microsoft.com/office/drawing/2014/main" id="{74EA76C7-8C08-E029-0E79-750B71C94A62}"/>
               </a:ext>
               <a:ext uri="{C183D7F6-B498-43B3-948B-1728B52AA6E4}">
-                <adec:decorative xmlns:adec="http://schemas.microsoft.com/office/drawing/2017/decorative" xmlns="" val="1"/>
+                <adec:decorative xmlns="" xmlns:adec="http://schemas.microsoft.com/office/drawing/2017/decorative" val="1"/>
               </a:ext>
             </a:extLst>
           </p:cNvPr>
@@ -6391,7 +6391,7 @@
             <p:ph sz="half" idx="2"/>
             <p:extLst>
               <p:ext uri="{E7BDC344-281C-4309-B0C6-D0EE65EED2A8}">
-                <p202:designPr xmlns:p202="http://schemas.microsoft.com/office/powerpoint/2020/02/main" xmlns="">
+                <p202:designPr xmlns="" xmlns:p202="http://schemas.microsoft.com/office/powerpoint/2020/02/main">
                   <p202:designTagLst>
                     <p202:designTag name="ARCH:1:CLS" val="InformationBlock"/>
                     <p202:designTag name="ARCH:1:VSVAR" val="TitledTextBox"/>
@@ -6687,7 +6687,7 @@
                 <a16:creationId xmlns:a16="http://schemas.microsoft.com/office/drawing/2014/main" id="{74EA76C7-8C08-E029-0E79-750B71C94A62}"/>
               </a:ext>
               <a:ext uri="{C183D7F6-B498-43B3-948B-1728B52AA6E4}">
-                <adec:decorative xmlns:adec="http://schemas.microsoft.com/office/drawing/2017/decorative" xmlns="" val="1"/>
+                <adec:decorative xmlns="" xmlns:adec="http://schemas.microsoft.com/office/drawing/2017/decorative" val="1"/>
               </a:ext>
             </a:extLst>
           </p:cNvPr>
@@ -7448,7 +7448,7 @@
                 <a16:creationId xmlns:a16="http://schemas.microsoft.com/office/drawing/2014/main" id="{5E8D3B17-7638-DFD3-18E4-8A6D611749CF}"/>
               </a:ext>
               <a:ext uri="{C183D7F6-B498-43B3-948B-1728B52AA6E4}">
-                <adec:decorative xmlns:adec="http://schemas.microsoft.com/office/drawing/2017/decorative" xmlns="" val="1"/>
+                <adec:decorative xmlns="" xmlns:adec="http://schemas.microsoft.com/office/drawing/2017/decorative" val="1"/>
               </a:ext>
             </a:extLst>
           </p:cNvPr>
@@ -7883,7 +7883,7 @@
                 <a16:creationId xmlns:a16="http://schemas.microsoft.com/office/drawing/2014/main" id="{B8ADE68D-5E75-5D63-4B8C-6BEFCE9D06E3}"/>
               </a:ext>
               <a:ext uri="{C183D7F6-B498-43B3-948B-1728B52AA6E4}">
-                <adec:decorative xmlns:adec="http://schemas.microsoft.com/office/drawing/2017/decorative" xmlns="" val="1"/>
+                <adec:decorative xmlns="" xmlns:adec="http://schemas.microsoft.com/office/drawing/2017/decorative" val="1"/>
               </a:ext>
             </a:extLst>
           </p:cNvPr>
@@ -8013,7 +8013,7 @@
         </p:nvSpPr>
         <p:spPr>
           <a:xfrm>
-            <a:off x="3442951" y="4073931"/>
+            <a:off x="3318773" y="4037373"/>
             <a:ext cx="2424448" cy="888642"/>
           </a:xfrm>
           <a:prstGeom prst="rect">
@@ -8062,7 +8062,7 @@
         </p:nvSpPr>
         <p:spPr>
           <a:xfrm>
-            <a:off x="1207393" y="1775057"/>
+            <a:off x="1083215" y="1738499"/>
             <a:ext cx="1687133" cy="888642"/>
           </a:xfrm>
           <a:prstGeom prst="rect">
@@ -8111,7 +8111,7 @@
         </p:nvSpPr>
         <p:spPr>
           <a:xfrm>
-            <a:off x="1658156" y="4194300"/>
+            <a:off x="1533978" y="4157742"/>
             <a:ext cx="785611" cy="647904"/>
           </a:xfrm>
           <a:prstGeom prst="diamond">
@@ -8160,7 +8160,7 @@
         </p:nvCxnSpPr>
         <p:spPr>
           <a:xfrm>
-            <a:off x="2443767" y="4518252"/>
+            <a:off x="2319589" y="4481694"/>
             <a:ext cx="999184" cy="0"/>
           </a:xfrm>
           <a:prstGeom prst="straightConnector1">
@@ -8199,7 +8199,7 @@
         </p:nvCxnSpPr>
         <p:spPr>
           <a:xfrm flipH="1" flipV="1">
-            <a:off x="2050960" y="2678189"/>
+            <a:off x="1926782" y="2641631"/>
             <a:ext cx="1" cy="1501621"/>
           </a:xfrm>
           <a:prstGeom prst="line">
@@ -8235,7 +8235,7 @@
         </p:nvSpPr>
         <p:spPr>
           <a:xfrm>
-            <a:off x="1267494" y="2722897"/>
+            <a:off x="1143316" y="2686339"/>
             <a:ext cx="1931832" cy="369332"/>
           </a:xfrm>
           <a:prstGeom prst="rect">
@@ -8271,7 +8271,7 @@
         </p:nvSpPr>
         <p:spPr>
           <a:xfrm>
-            <a:off x="2807056" y="4657538"/>
+            <a:off x="2682878" y="4620980"/>
             <a:ext cx="1931832" cy="369332"/>
           </a:xfrm>
           <a:prstGeom prst="rect">
@@ -8306,7 +8306,7 @@
         </p:nvSpPr>
         <p:spPr>
           <a:xfrm>
-            <a:off x="7325791" y="2296594"/>
+            <a:off x="7201613" y="2260036"/>
             <a:ext cx="2190742" cy="888642"/>
           </a:xfrm>
           <a:prstGeom prst="rect">
@@ -8356,7 +8356,7 @@
         </p:nvSpPr>
         <p:spPr>
           <a:xfrm>
-            <a:off x="7506662" y="5748917"/>
+            <a:off x="7382484" y="5712359"/>
             <a:ext cx="2226656" cy="888642"/>
           </a:xfrm>
           <a:prstGeom prst="rect">
@@ -8406,7 +8406,7 @@
         </p:nvSpPr>
         <p:spPr>
           <a:xfrm>
-            <a:off x="3509353" y="2278576"/>
+            <a:off x="3385175" y="2242018"/>
             <a:ext cx="2358046" cy="888642"/>
           </a:xfrm>
           <a:prstGeom prst="rect">
@@ -8456,7 +8456,7 @@
         </p:nvSpPr>
         <p:spPr>
           <a:xfrm>
-            <a:off x="9206363" y="201028"/>
+            <a:off x="9082185" y="164470"/>
             <a:ext cx="2190742" cy="888642"/>
           </a:xfrm>
           <a:prstGeom prst="rect">
@@ -8556,7 +8556,7 @@
         </p:nvSpPr>
         <p:spPr>
           <a:xfrm>
-            <a:off x="9581212" y="3953562"/>
+            <a:off x="9457034" y="3917004"/>
             <a:ext cx="2226656" cy="888642"/>
           </a:xfrm>
           <a:prstGeom prst="rect">
@@ -8606,7 +8606,7 @@
         </p:nvSpPr>
         <p:spPr>
           <a:xfrm>
-            <a:off x="4262369" y="5131559"/>
+            <a:off x="4138191" y="5095001"/>
             <a:ext cx="785611" cy="647904"/>
           </a:xfrm>
           <a:prstGeom prst="diamond">
@@ -8652,7 +8652,7 @@
         </p:nvSpPr>
         <p:spPr>
           <a:xfrm>
-            <a:off x="6254858" y="5989655"/>
+            <a:off x="6130680" y="5953097"/>
             <a:ext cx="785611" cy="647904"/>
           </a:xfrm>
           <a:prstGeom prst="diamond">
@@ -8698,7 +8698,7 @@
         </p:nvSpPr>
         <p:spPr>
           <a:xfrm>
-            <a:off x="10301734" y="5612760"/>
+            <a:off x="10177556" y="5576202"/>
             <a:ext cx="785611" cy="647904"/>
           </a:xfrm>
           <a:prstGeom prst="diamond">
@@ -8744,7 +8744,7 @@
         </p:nvSpPr>
         <p:spPr>
           <a:xfrm>
-            <a:off x="10160575" y="2354237"/>
+            <a:off x="10036397" y="2317679"/>
             <a:ext cx="785611" cy="647904"/>
           </a:xfrm>
           <a:prstGeom prst="diamond">
@@ -8790,7 +8790,7 @@
         </p:nvSpPr>
         <p:spPr>
           <a:xfrm>
-            <a:off x="6060807" y="2416963"/>
+            <a:off x="5936629" y="2380405"/>
             <a:ext cx="785611" cy="647904"/>
           </a:xfrm>
           <a:prstGeom prst="diamond">
@@ -8836,7 +8836,7 @@
         </p:nvCxnSpPr>
         <p:spPr>
           <a:xfrm flipV="1">
-            <a:off x="5846701" y="2749793"/>
+            <a:off x="5722523" y="2713235"/>
             <a:ext cx="1601924" cy="1"/>
           </a:xfrm>
           <a:prstGeom prst="line">
@@ -8872,7 +8872,7 @@
         </p:nvCxnSpPr>
         <p:spPr>
           <a:xfrm flipV="1">
-            <a:off x="5723867" y="6313607"/>
+            <a:off x="5599689" y="6277049"/>
             <a:ext cx="1782795" cy="2"/>
           </a:xfrm>
           <a:prstGeom prst="line">
@@ -8908,7 +8908,7 @@
         </p:nvCxnSpPr>
         <p:spPr>
           <a:xfrm flipV="1">
-            <a:off x="9017559" y="6064918"/>
+            <a:off x="8893381" y="6028360"/>
             <a:ext cx="1782795" cy="2"/>
           </a:xfrm>
           <a:prstGeom prst="line">
@@ -8944,7 +8944,7 @@
         </p:nvCxnSpPr>
         <p:spPr>
           <a:xfrm flipH="1" flipV="1">
-            <a:off x="10673987" y="4364412"/>
+            <a:off x="10549809" y="4327854"/>
             <a:ext cx="1" cy="1501621"/>
           </a:xfrm>
           <a:prstGeom prst="line">
@@ -8982,7 +8982,7 @@
         </p:nvCxnSpPr>
         <p:spPr>
           <a:xfrm flipV="1">
-            <a:off x="10553381" y="1127717"/>
+            <a:off x="10429203" y="1091159"/>
             <a:ext cx="0" cy="1874424"/>
           </a:xfrm>
           <a:prstGeom prst="line">
@@ -9018,7 +9018,7 @@
         </p:nvCxnSpPr>
         <p:spPr>
           <a:xfrm flipV="1">
-            <a:off x="8958309" y="2693046"/>
+            <a:off x="8834131" y="2656488"/>
             <a:ext cx="1601924" cy="1"/>
           </a:xfrm>
           <a:prstGeom prst="line">
@@ -9054,7 +9054,7 @@
         </p:nvSpPr>
         <p:spPr>
           <a:xfrm>
-            <a:off x="4262369" y="3296622"/>
+            <a:off x="4138191" y="3260064"/>
             <a:ext cx="785611" cy="647904"/>
           </a:xfrm>
           <a:prstGeom prst="diamond">
@@ -9100,7 +9100,7 @@
         </p:nvCxnSpPr>
         <p:spPr>
           <a:xfrm flipH="1" flipV="1">
-            <a:off x="4637567" y="2722897"/>
+            <a:off x="4513389" y="2686339"/>
             <a:ext cx="6853" cy="3096803"/>
           </a:xfrm>
           <a:prstGeom prst="line">
@@ -9136,7 +9136,7 @@
         </p:nvSpPr>
         <p:spPr>
           <a:xfrm>
-            <a:off x="5001636" y="5496701"/>
+            <a:off x="4877458" y="5460143"/>
             <a:ext cx="1931832" cy="369332"/>
           </a:xfrm>
           <a:prstGeom prst="rect">
@@ -9171,7 +9171,7 @@
         </p:nvSpPr>
         <p:spPr>
           <a:xfrm>
-            <a:off x="4963235" y="4952310"/>
+            <a:off x="4839057" y="4915752"/>
             <a:ext cx="1931832" cy="369332"/>
           </a:xfrm>
           <a:prstGeom prst="rect">
@@ -9207,7 +9207,7 @@
         </p:nvSpPr>
         <p:spPr>
           <a:xfrm>
-            <a:off x="4984861" y="3777427"/>
+            <a:off x="4860683" y="3740869"/>
             <a:ext cx="1931832" cy="369332"/>
           </a:xfrm>
           <a:prstGeom prst="rect">
@@ -9243,7 +9243,7 @@
         </p:nvSpPr>
         <p:spPr>
           <a:xfrm>
-            <a:off x="4868282" y="3210052"/>
+            <a:off x="4744104" y="3173494"/>
             <a:ext cx="1931832" cy="369332"/>
           </a:xfrm>
           <a:prstGeom prst="rect">
@@ -9278,7 +9278,7 @@
         </p:nvSpPr>
         <p:spPr>
           <a:xfrm>
-            <a:off x="7119778" y="5931624"/>
+            <a:off x="6995600" y="5895066"/>
             <a:ext cx="1931832" cy="369332"/>
           </a:xfrm>
           <a:prstGeom prst="rect">
@@ -9314,7 +9314,7 @@
         </p:nvSpPr>
         <p:spPr>
           <a:xfrm>
-            <a:off x="5846701" y="5979716"/>
+            <a:off x="5722523" y="5943158"/>
             <a:ext cx="1931832" cy="369332"/>
           </a:xfrm>
           <a:prstGeom prst="rect">
@@ -9349,7 +9349,7 @@
         </p:nvSpPr>
         <p:spPr>
           <a:xfrm>
-            <a:off x="5846701" y="2408153"/>
+            <a:off x="5722523" y="2371595"/>
             <a:ext cx="1931832" cy="369332"/>
           </a:xfrm>
           <a:prstGeom prst="rect">
@@ -9384,7 +9384,7 @@
         </p:nvSpPr>
         <p:spPr>
           <a:xfrm>
-            <a:off x="6989781" y="2448197"/>
+            <a:off x="6865603" y="2411639"/>
             <a:ext cx="1931832" cy="369332"/>
           </a:xfrm>
           <a:prstGeom prst="rect">
@@ -9420,7 +9420,7 @@
         </p:nvSpPr>
         <p:spPr>
           <a:xfrm>
-            <a:off x="10225476" y="1063199"/>
+            <a:off x="10101298" y="1026641"/>
             <a:ext cx="1931832" cy="369332"/>
           </a:xfrm>
           <a:prstGeom prst="rect">
@@ -9456,7 +9456,7 @@
         </p:nvSpPr>
         <p:spPr>
           <a:xfrm>
-            <a:off x="9477945" y="2290472"/>
+            <a:off x="9353767" y="2253914"/>
             <a:ext cx="1931832" cy="369332"/>
           </a:xfrm>
           <a:prstGeom prst="rect">
@@ -9527,7 +9527,7 @@
         </p:nvSpPr>
         <p:spPr>
           <a:xfrm>
-            <a:off x="9708071" y="6103810"/>
+            <a:off x="9583893" y="6067252"/>
             <a:ext cx="1931832" cy="369332"/>
           </a:xfrm>
           <a:prstGeom prst="rect">
@@ -9610,7 +9610,7 @@
                 <a16:creationId xmlns:a16="http://schemas.microsoft.com/office/drawing/2014/main" id="{8450EF29-A29A-9417-2B09-074C04064425}"/>
               </a:ext>
               <a:ext uri="{C183D7F6-B498-43B3-948B-1728B52AA6E4}">
-                <adec:decorative xmlns:adec="http://schemas.microsoft.com/office/drawing/2017/decorative" xmlns="" val="1"/>
+                <adec:decorative xmlns="" xmlns:adec="http://schemas.microsoft.com/office/drawing/2017/decorative" val="1"/>
               </a:ext>
             </a:extLst>
           </p:cNvPr>
@@ -10302,7 +10302,7 @@
                 <a16:creationId xmlns:a16="http://schemas.microsoft.com/office/drawing/2014/main" id="{8450EF29-A29A-9417-2B09-074C04064425}"/>
               </a:ext>
               <a:ext uri="{C183D7F6-B498-43B3-948B-1728B52AA6E4}">
-                <adec:decorative xmlns:adec="http://schemas.microsoft.com/office/drawing/2017/decorative" xmlns="" val="1"/>
+                <adec:decorative xmlns="" xmlns:adec="http://schemas.microsoft.com/office/drawing/2017/decorative" val="1"/>
               </a:ext>
             </a:extLst>
           </p:cNvPr>
@@ -10953,7 +10953,7 @@
                 <a16:creationId xmlns:a16="http://schemas.microsoft.com/office/drawing/2014/main" id="{5E8D3B17-7638-DFD3-18E4-8A6D611749CF}"/>
               </a:ext>
               <a:ext uri="{C183D7F6-B498-43B3-948B-1728B52AA6E4}">
-                <adec:decorative xmlns:adec="http://schemas.microsoft.com/office/drawing/2017/decorative" xmlns="" val="1"/>
+                <adec:decorative xmlns="" xmlns:adec="http://schemas.microsoft.com/office/drawing/2017/decorative" val="1"/>
               </a:ext>
             </a:extLst>
           </p:cNvPr>
@@ -11113,7 +11113,7 @@
                 <a16:creationId xmlns:a16="http://schemas.microsoft.com/office/drawing/2014/main" id="{5E8D3B17-7638-DFD3-18E4-8A6D611749CF}"/>
               </a:ext>
               <a:ext uri="{C183D7F6-B498-43B3-948B-1728B52AA6E4}">
-                <adec:decorative xmlns:adec="http://schemas.microsoft.com/office/drawing/2017/decorative" xmlns="" val="1"/>
+                <adec:decorative xmlns="" xmlns:adec="http://schemas.microsoft.com/office/drawing/2017/decorative" val="1"/>
               </a:ext>
             </a:extLst>
           </p:cNvPr>
@@ -11357,7 +11357,7 @@
                 <a16:creationId xmlns:a16="http://schemas.microsoft.com/office/drawing/2014/main" id="{5E8D3B17-7638-DFD3-18E4-8A6D611749CF}"/>
               </a:ext>
               <a:ext uri="{C183D7F6-B498-43B3-948B-1728B52AA6E4}">
-                <adec:decorative xmlns:adec="http://schemas.microsoft.com/office/drawing/2017/decorative" xmlns="" val="1"/>
+                <adec:decorative xmlns="" xmlns:adec="http://schemas.microsoft.com/office/drawing/2017/decorative" val="1"/>
               </a:ext>
             </a:extLst>
           </p:cNvPr>
@@ -12224,7 +12224,7 @@
                 <a16:creationId xmlns:a16="http://schemas.microsoft.com/office/drawing/2014/main" id="{5E8D3B17-7638-DFD3-18E4-8A6D611749CF}"/>
               </a:ext>
               <a:ext uri="{C183D7F6-B498-43B3-948B-1728B52AA6E4}">
-                <adec:decorative xmlns:adec="http://schemas.microsoft.com/office/drawing/2017/decorative" xmlns="" val="1"/>
+                <adec:decorative xmlns="" xmlns:adec="http://schemas.microsoft.com/office/drawing/2017/decorative" val="1"/>
               </a:ext>
             </a:extLst>
           </p:cNvPr>
@@ -12361,7 +12361,7 @@
             <p:ph sz="half" idx="2"/>
             <p:extLst>
               <p:ext uri="{E7BDC344-281C-4309-B0C6-D0EE65EED2A8}">
-                <p202:designPr xmlns:p202="http://schemas.microsoft.com/office/powerpoint/2020/02/main" xmlns="">
+                <p202:designPr xmlns="" xmlns:p202="http://schemas.microsoft.com/office/powerpoint/2020/02/main">
                   <p202:designTagLst>
                     <p202:designTag name="ARCH:1:CLS" val="InformationBlock"/>
                     <p202:designTag name="ARCH:1:VSVAR" val="TitledTextBox"/>
@@ -12587,7 +12587,7 @@
                 <a16:creationId xmlns:a16="http://schemas.microsoft.com/office/drawing/2014/main" id="{5E8D3B17-7638-DFD3-18E4-8A6D611749CF}"/>
               </a:ext>
               <a:ext uri="{C183D7F6-B498-43B3-948B-1728B52AA6E4}">
-                <adec:decorative xmlns:adec="http://schemas.microsoft.com/office/drawing/2017/decorative" xmlns="" val="1"/>
+                <adec:decorative xmlns="" xmlns:adec="http://schemas.microsoft.com/office/drawing/2017/decorative" val="1"/>
               </a:ext>
             </a:extLst>
           </p:cNvPr>
@@ -12796,7 +12796,7 @@
             <p:ph sz="half" idx="2"/>
             <p:extLst>
               <p:ext uri="{E7BDC344-281C-4309-B0C6-D0EE65EED2A8}">
-                <p202:designPr xmlns:p202="http://schemas.microsoft.com/office/powerpoint/2020/02/main" xmlns="">
+                <p202:designPr xmlns="" xmlns:p202="http://schemas.microsoft.com/office/powerpoint/2020/02/main">
                   <p202:designTagLst>
                     <p202:designTag name="ARCH:1:CLS" val="InformationBlock"/>
                     <p202:designTag name="ARCH:1:VSVAR" val="TitledTextBox"/>
@@ -13048,7 +13048,7 @@
                 <a16:creationId xmlns:a16="http://schemas.microsoft.com/office/drawing/2014/main" id="{5E8D3B17-7638-DFD3-18E4-8A6D611749CF}"/>
               </a:ext>
               <a:ext uri="{C183D7F6-B498-43B3-948B-1728B52AA6E4}">
-                <adec:decorative xmlns:adec="http://schemas.microsoft.com/office/drawing/2017/decorative" xmlns="" val="1"/>
+                <adec:decorative xmlns="" xmlns:adec="http://schemas.microsoft.com/office/drawing/2017/decorative" val="1"/>
               </a:ext>
             </a:extLst>
           </p:cNvPr>
@@ -13175,7 +13175,7 @@
             <p:ph sz="half" idx="2"/>
             <p:extLst>
               <p:ext uri="{E7BDC344-281C-4309-B0C6-D0EE65EED2A8}">
-                <p202:designPr xmlns:p202="http://schemas.microsoft.com/office/powerpoint/2020/02/main" xmlns="">
+                <p202:designPr xmlns="" xmlns:p202="http://schemas.microsoft.com/office/powerpoint/2020/02/main">
                   <p202:designTagLst>
                     <p202:designTag name="ARCH:1:CLS" val="InformationBlock"/>
                     <p202:designTag name="ARCH:1:VSVAR" val="TitledTextBox"/>
@@ -13492,7 +13492,7 @@
                 <a16:creationId xmlns:a16="http://schemas.microsoft.com/office/drawing/2014/main" id="{E1D40FB4-97DC-F5FF-9E7A-C10E078A1532}"/>
               </a:ext>
               <a:ext uri="{C183D7F6-B498-43B3-948B-1728B52AA6E4}">
-                <adec:decorative xmlns:adec="http://schemas.microsoft.com/office/drawing/2017/decorative" xmlns="" val="1"/>
+                <adec:decorative xmlns="" xmlns:adec="http://schemas.microsoft.com/office/drawing/2017/decorative" val="1"/>
               </a:ext>
             </a:extLst>
           </p:cNvPr>
@@ -13622,7 +13622,7 @@
             <p:ph sz="half" idx="2"/>
             <p:extLst>
               <p:ext uri="{E7BDC344-281C-4309-B0C6-D0EE65EED2A8}">
-                <p202:designPr xmlns:p202="http://schemas.microsoft.com/office/powerpoint/2020/02/main" xmlns="">
+                <p202:designPr xmlns="" xmlns:p202="http://schemas.microsoft.com/office/powerpoint/2020/02/main">
                   <p202:designTagLst>
                     <p202:designTag name="ARCH:1:CLS" val="InformationBlock"/>
                     <p202:designTag name="ARCH:1:VSVAR" val="TitledTextBox"/>
@@ -13880,7 +13880,7 @@
                 <a16:creationId xmlns:a16="http://schemas.microsoft.com/office/drawing/2014/main" id="{A51D6A68-C3BD-3399-CCA8-A7290FC8E09C}"/>
               </a:ext>
               <a:ext uri="{C183D7F6-B498-43B3-948B-1728B52AA6E4}">
-                <adec:decorative xmlns:adec="http://schemas.microsoft.com/office/drawing/2017/decorative" xmlns="" val="1"/>
+                <adec:decorative xmlns="" xmlns:adec="http://schemas.microsoft.com/office/drawing/2017/decorative" val="1"/>
               </a:ext>
             </a:extLst>
           </p:cNvPr>
@@ -14008,7 +14008,7 @@
             <p:ph sz="half" idx="2"/>
             <p:extLst>
               <p:ext uri="{E7BDC344-281C-4309-B0C6-D0EE65EED2A8}">
-                <p202:designPr xmlns:p202="http://schemas.microsoft.com/office/powerpoint/2020/02/main" xmlns="">
+                <p202:designPr xmlns="" xmlns:p202="http://schemas.microsoft.com/office/powerpoint/2020/02/main">
                   <p202:designTagLst>
                     <p202:designTag name="ARCH:1:CLS" val="InformationBlock"/>
                     <p202:designTag name="ARCH:1:VSVAR" val="TitledTextBox"/>
@@ -14266,7 +14266,7 @@
                 <a16:creationId xmlns:a16="http://schemas.microsoft.com/office/drawing/2014/main" id="{7F39A533-5E9C-439F-5CF1-06FFAB778C1F}"/>
               </a:ext>
               <a:ext uri="{C183D7F6-B498-43B3-948B-1728B52AA6E4}">
-                <adec:decorative xmlns:adec="http://schemas.microsoft.com/office/drawing/2017/decorative" xmlns="" val="1"/>
+                <adec:decorative xmlns="" xmlns:adec="http://schemas.microsoft.com/office/drawing/2017/decorative" val="1"/>
               </a:ext>
             </a:extLst>
           </p:cNvPr>
@@ -14394,7 +14394,7 @@
             <p:ph sz="half" idx="2"/>
             <p:extLst>
               <p:ext uri="{E7BDC344-281C-4309-B0C6-D0EE65EED2A8}">
-                <p202:designPr xmlns:p202="http://schemas.microsoft.com/office/powerpoint/2020/02/main" xmlns="">
+                <p202:designPr xmlns="" xmlns:p202="http://schemas.microsoft.com/office/powerpoint/2020/02/main">
                   <p202:designTagLst>
                     <p202:designTag name="ARCH:1:CLS" val="InformationBlock"/>
                     <p202:designTag name="ARCH:1:VSVAR" val="TitledTextBox"/>
@@ -14667,7 +14667,7 @@
                 <a16:creationId xmlns:a16="http://schemas.microsoft.com/office/drawing/2014/main" id="{A82A2D76-411A-C189-4AD9-642686996848}"/>
               </a:ext>
               <a:ext uri="{C183D7F6-B498-43B3-948B-1728B52AA6E4}">
-                <adec:decorative xmlns:adec="http://schemas.microsoft.com/office/drawing/2017/decorative" xmlns="" val="1"/>
+                <adec:decorative xmlns="" xmlns:adec="http://schemas.microsoft.com/office/drawing/2017/decorative" val="1"/>
               </a:ext>
             </a:extLst>
           </p:cNvPr>
@@ -14795,7 +14795,7 @@
             <p:ph sz="half" idx="2"/>
             <p:extLst>
               <p:ext uri="{E7BDC344-281C-4309-B0C6-D0EE65EED2A8}">
-                <p202:designPr xmlns:p202="http://schemas.microsoft.com/office/powerpoint/2020/02/main" xmlns="">
+                <p202:designPr xmlns="" xmlns:p202="http://schemas.microsoft.com/office/powerpoint/2020/02/main">
                   <p202:designTagLst>
                     <p202:designTag name="ARCH:1:CLS" val="InformationBlock"/>
                     <p202:designTag name="ARCH:1:VSVAR" val="TitledTextBox"/>
@@ -15056,7 +15056,7 @@
                 <a16:creationId xmlns:a16="http://schemas.microsoft.com/office/drawing/2014/main" id="{E482AA53-DA69-E258-8B64-8F8CE86FCDD4}"/>
               </a:ext>
               <a:ext uri="{C183D7F6-B498-43B3-948B-1728B52AA6E4}">
-                <adec:decorative xmlns:adec="http://schemas.microsoft.com/office/drawing/2017/decorative" xmlns="" val="1"/>
+                <adec:decorative xmlns="" xmlns:adec="http://schemas.microsoft.com/office/drawing/2017/decorative" val="1"/>
               </a:ext>
             </a:extLst>
           </p:cNvPr>
@@ -15184,7 +15184,7 @@
             <p:ph sz="half" idx="2"/>
             <p:extLst>
               <p:ext uri="{E7BDC344-281C-4309-B0C6-D0EE65EED2A8}">
-                <p202:designPr xmlns:p202="http://schemas.microsoft.com/office/powerpoint/2020/02/main" xmlns="">
+                <p202:designPr xmlns="" xmlns:p202="http://schemas.microsoft.com/office/powerpoint/2020/02/main">
                   <p202:designTagLst>
                     <p202:designTag name="ARCH:1:CLS" val="InformationBlock"/>
                     <p202:designTag name="ARCH:1:VSVAR" val="TitledTextBox"/>
@@ -15460,7 +15460,7 @@
                 <a16:creationId xmlns:a16="http://schemas.microsoft.com/office/drawing/2014/main" id="{5C27E16A-554C-D4AC-900E-AA69DDAEDE03}"/>
               </a:ext>
               <a:ext uri="{C183D7F6-B498-43B3-948B-1728B52AA6E4}">
-                <adec:decorative xmlns:adec="http://schemas.microsoft.com/office/drawing/2017/decorative" xmlns="" val="1"/>
+                <adec:decorative xmlns="" xmlns:adec="http://schemas.microsoft.com/office/drawing/2017/decorative" val="1"/>
               </a:ext>
             </a:extLst>
           </p:cNvPr>
@@ -15588,7 +15588,7 @@
             <p:ph sz="half" idx="2"/>
             <p:extLst>
               <p:ext uri="{E7BDC344-281C-4309-B0C6-D0EE65EED2A8}">
-                <p202:designPr xmlns:p202="http://schemas.microsoft.com/office/powerpoint/2020/02/main" xmlns="">
+                <p202:designPr xmlns="" xmlns:p202="http://schemas.microsoft.com/office/powerpoint/2020/02/main">
                   <p202:designTagLst>
                     <p202:designTag name="ARCH:1:CLS" val="InformationBlock"/>
                     <p202:designTag name="ARCH:1:VSVAR" val="TitledTextBox"/>

</xml_diff>